<commit_message>
finalizing phase 1 of the exercise
</commit_message>
<xml_diff>
--- a/documents/ERF.pptx
+++ b/documents/ERF.pptx
@@ -104,6 +104,11 @@
       </a:defRPr>
     </a:lvl9pPr>
   </p:defaultTextStyle>
+  <p:extLst>
+    <p:ext uri="{EFAFB233-063F-42B5-8137-9DF3F51BA10A}">
+      <p15:sldGuideLst xmlns:p15="http://schemas.microsoft.com/office/powerpoint/2012/main"/>
+    </p:ext>
+  </p:extLst>
 </p:presentation>
 </file>
 
@@ -152,7 +157,6 @@
               <a:rPr lang="en-US"/>
               <a:t>Click to edit Master title style</a:t>
             </a:r>
-            <a:endParaRPr lang="en-US"/>
           </a:p>
         </p:txBody>
       </p:sp>
@@ -217,7 +221,6 @@
               <a:rPr lang="en-US"/>
               <a:t>Click to edit Master subtitle style</a:t>
             </a:r>
-            <a:endParaRPr lang="en-US"/>
           </a:p>
         </p:txBody>
       </p:sp>
@@ -238,7 +241,7 @@
           <a:p>
             <a:fld id="{9CF71C48-D304-4A48-BAC6-9C5BC7076525}" type="datetimeFigureOut">
               <a:rPr lang="en-US" smtClean="0"/>
-              <a:t>10/3/2017</a:t>
+              <a:t>10/25/2017</a:t>
             </a:fld>
             <a:endParaRPr lang="en-US"/>
           </a:p>
@@ -335,7 +338,6 @@
               <a:rPr lang="en-US"/>
               <a:t>Click to edit Master title style</a:t>
             </a:r>
-            <a:endParaRPr lang="en-US"/>
           </a:p>
         </p:txBody>
       </p:sp>
@@ -387,7 +389,6 @@
               <a:rPr lang="en-US"/>
               <a:t>Fifth level</a:t>
             </a:r>
-            <a:endParaRPr lang="en-US"/>
           </a:p>
         </p:txBody>
       </p:sp>
@@ -408,7 +409,7 @@
           <a:p>
             <a:fld id="{9CF71C48-D304-4A48-BAC6-9C5BC7076525}" type="datetimeFigureOut">
               <a:rPr lang="en-US" smtClean="0"/>
-              <a:t>10/3/2017</a:t>
+              <a:t>10/25/2017</a:t>
             </a:fld>
             <a:endParaRPr lang="en-US"/>
           </a:p>
@@ -510,7 +511,6 @@
               <a:rPr lang="en-US"/>
               <a:t>Click to edit Master title style</a:t>
             </a:r>
-            <a:endParaRPr lang="en-US"/>
           </a:p>
         </p:txBody>
       </p:sp>
@@ -567,7 +567,6 @@
               <a:rPr lang="en-US"/>
               <a:t>Fifth level</a:t>
             </a:r>
-            <a:endParaRPr lang="en-US"/>
           </a:p>
         </p:txBody>
       </p:sp>
@@ -588,7 +587,7 @@
           <a:p>
             <a:fld id="{9CF71C48-D304-4A48-BAC6-9C5BC7076525}" type="datetimeFigureOut">
               <a:rPr lang="en-US" smtClean="0"/>
-              <a:t>10/3/2017</a:t>
+              <a:t>10/25/2017</a:t>
             </a:fld>
             <a:endParaRPr lang="en-US"/>
           </a:p>
@@ -685,7 +684,6 @@
               <a:rPr lang="en-US"/>
               <a:t>Click to edit Master title style</a:t>
             </a:r>
-            <a:endParaRPr lang="en-US"/>
           </a:p>
         </p:txBody>
       </p:sp>
@@ -737,7 +735,6 @@
               <a:rPr lang="en-US"/>
               <a:t>Fifth level</a:t>
             </a:r>
-            <a:endParaRPr lang="en-US"/>
           </a:p>
         </p:txBody>
       </p:sp>
@@ -758,7 +755,7 @@
           <a:p>
             <a:fld id="{9CF71C48-D304-4A48-BAC6-9C5BC7076525}" type="datetimeFigureOut">
               <a:rPr lang="en-US" smtClean="0"/>
-              <a:t>10/3/2017</a:t>
+              <a:t>10/25/2017</a:t>
             </a:fld>
             <a:endParaRPr lang="en-US"/>
           </a:p>
@@ -864,7 +861,6 @@
               <a:rPr lang="en-US"/>
               <a:t>Click to edit Master title style</a:t>
             </a:r>
-            <a:endParaRPr lang="en-US"/>
           </a:p>
         </p:txBody>
       </p:sp>
@@ -1004,7 +1000,7 @@
           <a:p>
             <a:fld id="{9CF71C48-D304-4A48-BAC6-9C5BC7076525}" type="datetimeFigureOut">
               <a:rPr lang="en-US" smtClean="0"/>
-              <a:t>10/3/2017</a:t>
+              <a:t>10/25/2017</a:t>
             </a:fld>
             <a:endParaRPr lang="en-US"/>
           </a:p>
@@ -1101,7 +1097,6 @@
               <a:rPr lang="en-US"/>
               <a:t>Click to edit Master title style</a:t>
             </a:r>
-            <a:endParaRPr lang="en-US"/>
           </a:p>
         </p:txBody>
       </p:sp>
@@ -1158,7 +1153,6 @@
               <a:rPr lang="en-US"/>
               <a:t>Fifth level</a:t>
             </a:r>
-            <a:endParaRPr lang="en-US"/>
           </a:p>
         </p:txBody>
       </p:sp>
@@ -1215,7 +1209,6 @@
               <a:rPr lang="en-US"/>
               <a:t>Fifth level</a:t>
             </a:r>
-            <a:endParaRPr lang="en-US"/>
           </a:p>
         </p:txBody>
       </p:sp>
@@ -1236,7 +1229,7 @@
           <a:p>
             <a:fld id="{9CF71C48-D304-4A48-BAC6-9C5BC7076525}" type="datetimeFigureOut">
               <a:rPr lang="en-US" smtClean="0"/>
-              <a:t>10/3/2017</a:t>
+              <a:t>10/25/2017</a:t>
             </a:fld>
             <a:endParaRPr lang="en-US"/>
           </a:p>
@@ -1338,7 +1331,6 @@
               <a:rPr lang="en-US"/>
               <a:t>Click to edit Master title style</a:t>
             </a:r>
-            <a:endParaRPr lang="en-US"/>
           </a:p>
         </p:txBody>
       </p:sp>
@@ -1460,7 +1452,6 @@
               <a:rPr lang="en-US"/>
               <a:t>Fifth level</a:t>
             </a:r>
-            <a:endParaRPr lang="en-US"/>
           </a:p>
         </p:txBody>
       </p:sp>
@@ -1582,7 +1573,6 @@
               <a:rPr lang="en-US"/>
               <a:t>Fifth level</a:t>
             </a:r>
-            <a:endParaRPr lang="en-US"/>
           </a:p>
         </p:txBody>
       </p:sp>
@@ -1603,7 +1593,7 @@
           <a:p>
             <a:fld id="{9CF71C48-D304-4A48-BAC6-9C5BC7076525}" type="datetimeFigureOut">
               <a:rPr lang="en-US" smtClean="0"/>
-              <a:t>10/3/2017</a:t>
+              <a:t>10/25/2017</a:t>
             </a:fld>
             <a:endParaRPr lang="en-US"/>
           </a:p>
@@ -1700,7 +1690,6 @@
               <a:rPr lang="en-US"/>
               <a:t>Click to edit Master title style</a:t>
             </a:r>
-            <a:endParaRPr lang="en-US"/>
           </a:p>
         </p:txBody>
       </p:sp>
@@ -1721,7 +1710,7 @@
           <a:p>
             <a:fld id="{9CF71C48-D304-4A48-BAC6-9C5BC7076525}" type="datetimeFigureOut">
               <a:rPr lang="en-US" smtClean="0"/>
-              <a:t>10/3/2017</a:t>
+              <a:t>10/25/2017</a:t>
             </a:fld>
             <a:endParaRPr lang="en-US"/>
           </a:p>
@@ -1816,7 +1805,7 @@
           <a:p>
             <a:fld id="{9CF71C48-D304-4A48-BAC6-9C5BC7076525}" type="datetimeFigureOut">
               <a:rPr lang="en-US" smtClean="0"/>
-              <a:t>10/3/2017</a:t>
+              <a:t>10/25/2017</a:t>
             </a:fld>
             <a:endParaRPr lang="en-US"/>
           </a:p>
@@ -1922,7 +1911,6 @@
               <a:rPr lang="en-US"/>
               <a:t>Click to edit Master title style</a:t>
             </a:r>
-            <a:endParaRPr lang="en-US"/>
           </a:p>
         </p:txBody>
       </p:sp>
@@ -2007,7 +1995,6 @@
               <a:rPr lang="en-US"/>
               <a:t>Fifth level</a:t>
             </a:r>
-            <a:endParaRPr lang="en-US"/>
           </a:p>
         </p:txBody>
       </p:sp>
@@ -2093,7 +2080,7 @@
           <a:p>
             <a:fld id="{9CF71C48-D304-4A48-BAC6-9C5BC7076525}" type="datetimeFigureOut">
               <a:rPr lang="en-US" smtClean="0"/>
-              <a:t>10/3/2017</a:t>
+              <a:t>10/25/2017</a:t>
             </a:fld>
             <a:endParaRPr lang="en-US"/>
           </a:p>
@@ -2199,7 +2186,6 @@
               <a:rPr lang="en-US"/>
               <a:t>Click to edit Master title style</a:t>
             </a:r>
-            <a:endParaRPr lang="en-US"/>
           </a:p>
         </p:txBody>
       </p:sp>
@@ -2346,7 +2332,7 @@
           <a:p>
             <a:fld id="{9CF71C48-D304-4A48-BAC6-9C5BC7076525}" type="datetimeFigureOut">
               <a:rPr lang="en-US" smtClean="0"/>
-              <a:t>10/3/2017</a:t>
+              <a:t>10/25/2017</a:t>
             </a:fld>
             <a:endParaRPr lang="en-US"/>
           </a:p>
@@ -2458,7 +2444,6 @@
               <a:rPr lang="en-US"/>
               <a:t>Click to edit Master title style</a:t>
             </a:r>
-            <a:endParaRPr lang="en-US"/>
           </a:p>
         </p:txBody>
       </p:sp>
@@ -2520,7 +2505,6 @@
               <a:rPr lang="en-US"/>
               <a:t>Fifth level</a:t>
             </a:r>
-            <a:endParaRPr lang="en-US"/>
           </a:p>
         </p:txBody>
       </p:sp>
@@ -2559,7 +2543,7 @@
           <a:p>
             <a:fld id="{9CF71C48-D304-4A48-BAC6-9C5BC7076525}" type="datetimeFigureOut">
               <a:rPr lang="en-US" smtClean="0"/>
-              <a:t>10/3/2017</a:t>
+              <a:t>10/25/2017</a:t>
             </a:fld>
             <a:endParaRPr lang="en-US"/>
           </a:p>
@@ -2964,6 +2948,2061 @@
           <a:chExt cx="0" cy="0"/>
         </a:xfrm>
       </p:grpSpPr>
+      <p:grpSp>
+        <p:nvGrpSpPr>
+          <p:cNvPr id="4" name="Group 3"/>
+          <p:cNvGrpSpPr/>
+          <p:nvPr/>
+        </p:nvGrpSpPr>
+        <p:grpSpPr>
+          <a:xfrm>
+            <a:off x="4927596" y="2704128"/>
+            <a:ext cx="1745673" cy="1719211"/>
+            <a:chOff x="4091708" y="1958109"/>
+            <a:chExt cx="2105892" cy="1970978"/>
+          </a:xfrm>
+        </p:grpSpPr>
+        <p:sp>
+          <p:nvSpPr>
+            <p:cNvPr id="2" name="Rectangle 1"/>
+            <p:cNvSpPr/>
+            <p:nvPr/>
+          </p:nvSpPr>
+          <p:spPr>
+            <a:xfrm>
+              <a:off x="4091710" y="2346037"/>
+              <a:ext cx="2105890" cy="1583050"/>
+            </a:xfrm>
+            <a:prstGeom prst="rect">
+              <a:avLst/>
+            </a:prstGeom>
+            <a:solidFill>
+              <a:schemeClr val="bg1"/>
+            </a:solidFill>
+            <a:ln>
+              <a:solidFill>
+                <a:schemeClr val="tx1"/>
+              </a:solidFill>
+            </a:ln>
+          </p:spPr>
+          <p:style>
+            <a:lnRef idx="2">
+              <a:schemeClr val="accent1">
+                <a:shade val="50000"/>
+              </a:schemeClr>
+            </a:lnRef>
+            <a:fillRef idx="1">
+              <a:schemeClr val="accent1"/>
+            </a:fillRef>
+            <a:effectRef idx="0">
+              <a:schemeClr val="accent1"/>
+            </a:effectRef>
+            <a:fontRef idx="minor">
+              <a:schemeClr val="lt1"/>
+            </a:fontRef>
+          </p:style>
+          <p:txBody>
+            <a:bodyPr rtlCol="0" anchor="t"/>
+            <a:lstStyle/>
+            <a:p>
+              <a:pPr marL="285750" indent="-285750">
+                <a:buFont typeface="Arial" panose="020B0604020202020204" pitchFamily="34" charset="0"/>
+                <a:buChar char="•"/>
+              </a:pPr>
+              <a:r>
+                <a:rPr lang="en-US" sz="1050" dirty="0" err="1">
+                  <a:solidFill>
+                    <a:schemeClr val="tx1"/>
+                  </a:solidFill>
+                </a:rPr>
+                <a:t>hospital_id</a:t>
+              </a:r>
+              <a:endParaRPr lang="en-US" sz="1050" dirty="0">
+                <a:solidFill>
+                  <a:schemeClr val="tx1"/>
+                </a:solidFill>
+              </a:endParaRPr>
+            </a:p>
+            <a:p>
+              <a:pPr marL="285750" indent="-285750">
+                <a:buFont typeface="Arial" panose="020B0604020202020204" pitchFamily="34" charset="0"/>
+                <a:buChar char="•"/>
+              </a:pPr>
+              <a:r>
+                <a:rPr lang="en-US" sz="1050" dirty="0" err="1">
+                  <a:solidFill>
+                    <a:schemeClr val="tx1"/>
+                  </a:solidFill>
+                </a:rPr>
+                <a:t>hospital_name</a:t>
+              </a:r>
+              <a:endParaRPr lang="en-US" sz="1050" dirty="0">
+                <a:solidFill>
+                  <a:schemeClr val="tx1"/>
+                </a:solidFill>
+              </a:endParaRPr>
+            </a:p>
+            <a:p>
+              <a:pPr marL="285750" indent="-285750">
+                <a:buFont typeface="Arial" panose="020B0604020202020204" pitchFamily="34" charset="0"/>
+                <a:buChar char="•"/>
+              </a:pPr>
+              <a:r>
+                <a:rPr lang="en-US" sz="1050" dirty="0">
+                  <a:solidFill>
+                    <a:schemeClr val="tx1"/>
+                  </a:solidFill>
+                </a:rPr>
+                <a:t>city</a:t>
+              </a:r>
+            </a:p>
+            <a:p>
+              <a:pPr marL="285750" indent="-285750">
+                <a:buFont typeface="Arial" panose="020B0604020202020204" pitchFamily="34" charset="0"/>
+                <a:buChar char="•"/>
+              </a:pPr>
+              <a:r>
+                <a:rPr lang="en-US" sz="1050" dirty="0">
+                  <a:solidFill>
+                    <a:schemeClr val="tx1"/>
+                  </a:solidFill>
+                </a:rPr>
+                <a:t>state</a:t>
+              </a:r>
+            </a:p>
+            <a:p>
+              <a:pPr marL="285750" indent="-285750">
+                <a:buFont typeface="Arial" panose="020B0604020202020204" pitchFamily="34" charset="0"/>
+                <a:buChar char="•"/>
+              </a:pPr>
+              <a:r>
+                <a:rPr lang="en-US" sz="1050" dirty="0" err="1">
+                  <a:solidFill>
+                    <a:schemeClr val="tx1"/>
+                  </a:solidFill>
+                </a:rPr>
+                <a:t>zip_code</a:t>
+              </a:r>
+              <a:endParaRPr lang="en-US" sz="1050" dirty="0">
+                <a:solidFill>
+                  <a:schemeClr val="tx1"/>
+                </a:solidFill>
+              </a:endParaRPr>
+            </a:p>
+            <a:p>
+              <a:pPr marL="285750" indent="-285750">
+                <a:buFont typeface="Arial" panose="020B0604020202020204" pitchFamily="34" charset="0"/>
+                <a:buChar char="•"/>
+              </a:pPr>
+              <a:r>
+                <a:rPr lang="en-US" sz="1050" dirty="0" err="1">
+                  <a:solidFill>
+                    <a:schemeClr val="tx1"/>
+                  </a:solidFill>
+                </a:rPr>
+                <a:t>county_name</a:t>
+              </a:r>
+              <a:endParaRPr lang="en-US" sz="1050" dirty="0">
+                <a:solidFill>
+                  <a:schemeClr val="tx1"/>
+                </a:solidFill>
+              </a:endParaRPr>
+            </a:p>
+            <a:p>
+              <a:pPr marL="285750" indent="-285750">
+                <a:buFont typeface="Arial" panose="020B0604020202020204" pitchFamily="34" charset="0"/>
+                <a:buChar char="•"/>
+              </a:pPr>
+              <a:r>
+                <a:rPr lang="en-US" sz="1050" dirty="0" err="1">
+                  <a:solidFill>
+                    <a:schemeClr val="tx1"/>
+                  </a:solidFill>
+                </a:rPr>
+                <a:t>hospital_type</a:t>
+              </a:r>
+              <a:endParaRPr lang="en-US" sz="1050" dirty="0">
+                <a:solidFill>
+                  <a:schemeClr val="tx1"/>
+                </a:solidFill>
+              </a:endParaRPr>
+            </a:p>
+            <a:p>
+              <a:pPr marL="285750" indent="-285750">
+                <a:buFont typeface="Arial" panose="020B0604020202020204" pitchFamily="34" charset="0"/>
+                <a:buChar char="•"/>
+              </a:pPr>
+              <a:r>
+                <a:rPr lang="en-US" sz="1050" dirty="0" err="1">
+                  <a:solidFill>
+                    <a:schemeClr val="tx1"/>
+                  </a:solidFill>
+                </a:rPr>
+                <a:t>hospital_ownership</a:t>
+              </a:r>
+              <a:endParaRPr lang="en-US" sz="1050" dirty="0">
+                <a:solidFill>
+                  <a:schemeClr val="tx1"/>
+                </a:solidFill>
+              </a:endParaRPr>
+            </a:p>
+          </p:txBody>
+        </p:sp>
+        <p:sp>
+          <p:nvSpPr>
+            <p:cNvPr id="3" name="Rectangle 2"/>
+            <p:cNvSpPr/>
+            <p:nvPr/>
+          </p:nvSpPr>
+          <p:spPr>
+            <a:xfrm>
+              <a:off x="4091708" y="1958109"/>
+              <a:ext cx="2105891" cy="387927"/>
+            </a:xfrm>
+            <a:prstGeom prst="rect">
+              <a:avLst/>
+            </a:prstGeom>
+            <a:ln>
+              <a:solidFill>
+                <a:schemeClr val="tx1"/>
+              </a:solidFill>
+            </a:ln>
+          </p:spPr>
+          <p:style>
+            <a:lnRef idx="2">
+              <a:schemeClr val="accent1">
+                <a:shade val="50000"/>
+              </a:schemeClr>
+            </a:lnRef>
+            <a:fillRef idx="1">
+              <a:schemeClr val="accent1"/>
+            </a:fillRef>
+            <a:effectRef idx="0">
+              <a:schemeClr val="accent1"/>
+            </a:effectRef>
+            <a:fontRef idx="minor">
+              <a:schemeClr val="lt1"/>
+            </a:fontRef>
+          </p:style>
+          <p:txBody>
+            <a:bodyPr rtlCol="0" anchor="ctr"/>
+            <a:lstStyle/>
+            <a:p>
+              <a:pPr algn="ctr"/>
+              <a:r>
+                <a:rPr lang="en-US" sz="1050" dirty="0"/>
+                <a:t>hospitals</a:t>
+              </a:r>
+            </a:p>
+          </p:txBody>
+        </p:sp>
+      </p:grpSp>
+      <p:grpSp>
+        <p:nvGrpSpPr>
+          <p:cNvPr id="5" name="Group 4"/>
+          <p:cNvGrpSpPr/>
+          <p:nvPr/>
+        </p:nvGrpSpPr>
+        <p:grpSpPr>
+          <a:xfrm>
+            <a:off x="9056254" y="104091"/>
+            <a:ext cx="1745673" cy="2207491"/>
+            <a:chOff x="4091708" y="1958109"/>
+            <a:chExt cx="2105892" cy="2530763"/>
+          </a:xfrm>
+        </p:grpSpPr>
+        <p:sp>
+          <p:nvSpPr>
+            <p:cNvPr id="6" name="Rectangle 5"/>
+            <p:cNvSpPr/>
+            <p:nvPr/>
+          </p:nvSpPr>
+          <p:spPr>
+            <a:xfrm>
+              <a:off x="4091710" y="2346035"/>
+              <a:ext cx="2105890" cy="2142837"/>
+            </a:xfrm>
+            <a:prstGeom prst="rect">
+              <a:avLst/>
+            </a:prstGeom>
+            <a:solidFill>
+              <a:schemeClr val="bg1"/>
+            </a:solidFill>
+            <a:ln>
+              <a:solidFill>
+                <a:schemeClr val="tx1"/>
+              </a:solidFill>
+            </a:ln>
+          </p:spPr>
+          <p:style>
+            <a:lnRef idx="2">
+              <a:schemeClr val="accent1">
+                <a:shade val="50000"/>
+              </a:schemeClr>
+            </a:lnRef>
+            <a:fillRef idx="1">
+              <a:schemeClr val="accent1"/>
+            </a:fillRef>
+            <a:effectRef idx="0">
+              <a:schemeClr val="accent1"/>
+            </a:effectRef>
+            <a:fontRef idx="minor">
+              <a:schemeClr val="lt1"/>
+            </a:fontRef>
+          </p:style>
+          <p:txBody>
+            <a:bodyPr rtlCol="0" anchor="t"/>
+            <a:lstStyle/>
+            <a:p>
+              <a:pPr marL="285750" indent="-285750">
+                <a:buFont typeface="Arial" panose="020B0604020202020204" pitchFamily="34" charset="0"/>
+                <a:buChar char="•"/>
+              </a:pPr>
+              <a:r>
+                <a:rPr lang="en-US" sz="1050" dirty="0" err="1">
+                  <a:solidFill>
+                    <a:schemeClr val="tx1"/>
+                  </a:solidFill>
+                </a:rPr>
+                <a:t>hospital_id</a:t>
+              </a:r>
+              <a:endParaRPr lang="en-US" sz="1050" dirty="0">
+                <a:solidFill>
+                  <a:schemeClr val="tx1"/>
+                </a:solidFill>
+              </a:endParaRPr>
+            </a:p>
+            <a:p>
+              <a:pPr marL="285750" indent="-285750">
+                <a:buFont typeface="Arial" panose="020B0604020202020204" pitchFamily="34" charset="0"/>
+                <a:buChar char="•"/>
+              </a:pPr>
+              <a:r>
+                <a:rPr lang="en-US" sz="1050" dirty="0" err="1">
+                  <a:solidFill>
+                    <a:schemeClr val="tx1"/>
+                  </a:solidFill>
+                </a:rPr>
+                <a:t>hospital_name</a:t>
+              </a:r>
+              <a:endParaRPr lang="en-US" sz="1050" dirty="0">
+                <a:solidFill>
+                  <a:schemeClr val="tx1"/>
+                </a:solidFill>
+              </a:endParaRPr>
+            </a:p>
+            <a:p>
+              <a:pPr marL="285750" indent="-285750">
+                <a:buFont typeface="Arial" panose="020B0604020202020204" pitchFamily="34" charset="0"/>
+                <a:buChar char="•"/>
+              </a:pPr>
+              <a:r>
+                <a:rPr lang="en-US" sz="1050" dirty="0">
+                  <a:solidFill>
+                    <a:schemeClr val="tx1"/>
+                  </a:solidFill>
+                </a:rPr>
+                <a:t>address</a:t>
+              </a:r>
+            </a:p>
+            <a:p>
+              <a:pPr marL="285750" indent="-285750">
+                <a:buFont typeface="Arial" panose="020B0604020202020204" pitchFamily="34" charset="0"/>
+                <a:buChar char="•"/>
+              </a:pPr>
+              <a:r>
+                <a:rPr lang="en-US" sz="1050" dirty="0">
+                  <a:solidFill>
+                    <a:schemeClr val="tx1"/>
+                  </a:solidFill>
+                </a:rPr>
+                <a:t>city</a:t>
+              </a:r>
+            </a:p>
+            <a:p>
+              <a:pPr marL="285750" indent="-285750">
+                <a:buFont typeface="Arial" panose="020B0604020202020204" pitchFamily="34" charset="0"/>
+                <a:buChar char="•"/>
+              </a:pPr>
+              <a:r>
+                <a:rPr lang="en-US" sz="1050" dirty="0">
+                  <a:solidFill>
+                    <a:schemeClr val="tx1"/>
+                  </a:solidFill>
+                </a:rPr>
+                <a:t>state</a:t>
+              </a:r>
+            </a:p>
+            <a:p>
+              <a:pPr marL="285750" indent="-285750">
+                <a:buFont typeface="Arial" panose="020B0604020202020204" pitchFamily="34" charset="0"/>
+                <a:buChar char="•"/>
+              </a:pPr>
+              <a:r>
+                <a:rPr lang="en-US" sz="1050" dirty="0" err="1">
+                  <a:solidFill>
+                    <a:schemeClr val="tx1"/>
+                  </a:solidFill>
+                </a:rPr>
+                <a:t>zip_code</a:t>
+              </a:r>
+              <a:endParaRPr lang="en-US" sz="1050" dirty="0">
+                <a:solidFill>
+                  <a:schemeClr val="tx1"/>
+                </a:solidFill>
+              </a:endParaRPr>
+            </a:p>
+            <a:p>
+              <a:pPr marL="285750" indent="-285750">
+                <a:buFont typeface="Arial" panose="020B0604020202020204" pitchFamily="34" charset="0"/>
+                <a:buChar char="•"/>
+              </a:pPr>
+              <a:r>
+                <a:rPr lang="en-US" sz="1050" dirty="0" err="1">
+                  <a:solidFill>
+                    <a:schemeClr val="tx1"/>
+                  </a:solidFill>
+                </a:rPr>
+                <a:t>county_name</a:t>
+              </a:r>
+              <a:endParaRPr lang="en-US" sz="1050" dirty="0">
+                <a:solidFill>
+                  <a:schemeClr val="tx1"/>
+                </a:solidFill>
+              </a:endParaRPr>
+            </a:p>
+            <a:p>
+              <a:pPr marL="285750" indent="-285750">
+                <a:buFont typeface="Arial" panose="020B0604020202020204" pitchFamily="34" charset="0"/>
+                <a:buChar char="•"/>
+              </a:pPr>
+              <a:r>
+                <a:rPr lang="en-US" sz="1050" dirty="0" err="1">
+                  <a:solidFill>
+                    <a:schemeClr val="tx1"/>
+                  </a:solidFill>
+                </a:rPr>
+                <a:t>phone_number</a:t>
+              </a:r>
+              <a:endParaRPr lang="en-US" sz="1050" dirty="0">
+                <a:solidFill>
+                  <a:schemeClr val="tx1"/>
+                </a:solidFill>
+              </a:endParaRPr>
+            </a:p>
+            <a:p>
+              <a:pPr marL="285750" indent="-285750">
+                <a:buFont typeface="Arial" panose="020B0604020202020204" pitchFamily="34" charset="0"/>
+                <a:buChar char="•"/>
+              </a:pPr>
+              <a:r>
+                <a:rPr lang="en-US" sz="1050" dirty="0" err="1">
+                  <a:solidFill>
+                    <a:schemeClr val="tx1"/>
+                  </a:solidFill>
+                </a:rPr>
+                <a:t>hospital_type</a:t>
+              </a:r>
+              <a:endParaRPr lang="en-US" sz="1050" dirty="0">
+                <a:solidFill>
+                  <a:schemeClr val="tx1"/>
+                </a:solidFill>
+              </a:endParaRPr>
+            </a:p>
+            <a:p>
+              <a:pPr marL="285750" indent="-285750">
+                <a:buFont typeface="Arial" panose="020B0604020202020204" pitchFamily="34" charset="0"/>
+                <a:buChar char="•"/>
+              </a:pPr>
+              <a:r>
+                <a:rPr lang="en-US" sz="1050" dirty="0" err="1">
+                  <a:solidFill>
+                    <a:schemeClr val="tx1"/>
+                  </a:solidFill>
+                </a:rPr>
+                <a:t>hospital_ownership</a:t>
+              </a:r>
+              <a:endParaRPr lang="en-US" sz="1050" dirty="0">
+                <a:solidFill>
+                  <a:schemeClr val="tx1"/>
+                </a:solidFill>
+              </a:endParaRPr>
+            </a:p>
+            <a:p>
+              <a:pPr marL="285750" indent="-285750">
+                <a:buFont typeface="Arial" panose="020B0604020202020204" pitchFamily="34" charset="0"/>
+                <a:buChar char="•"/>
+              </a:pPr>
+              <a:r>
+                <a:rPr lang="en-US" sz="1050" dirty="0" err="1">
+                  <a:solidFill>
+                    <a:schemeClr val="tx1"/>
+                  </a:solidFill>
+                </a:rPr>
+                <a:t>emergency_services</a:t>
+              </a:r>
+              <a:endParaRPr lang="en-US" sz="1050" dirty="0">
+                <a:solidFill>
+                  <a:schemeClr val="tx1"/>
+                </a:solidFill>
+              </a:endParaRPr>
+            </a:p>
+          </p:txBody>
+        </p:sp>
+        <p:sp>
+          <p:nvSpPr>
+            <p:cNvPr id="7" name="Rectangle 6"/>
+            <p:cNvSpPr/>
+            <p:nvPr/>
+          </p:nvSpPr>
+          <p:spPr>
+            <a:xfrm>
+              <a:off x="4091708" y="1958109"/>
+              <a:ext cx="2105891" cy="387927"/>
+            </a:xfrm>
+            <a:prstGeom prst="rect">
+              <a:avLst/>
+            </a:prstGeom>
+            <a:ln>
+              <a:solidFill>
+                <a:schemeClr val="tx1"/>
+              </a:solidFill>
+            </a:ln>
+          </p:spPr>
+          <p:style>
+            <a:lnRef idx="2">
+              <a:schemeClr val="accent1">
+                <a:shade val="50000"/>
+              </a:schemeClr>
+            </a:lnRef>
+            <a:fillRef idx="1">
+              <a:schemeClr val="accent1"/>
+            </a:fillRef>
+            <a:effectRef idx="0">
+              <a:schemeClr val="accent1"/>
+            </a:effectRef>
+            <a:fontRef idx="minor">
+              <a:schemeClr val="lt1"/>
+            </a:fontRef>
+          </p:style>
+          <p:txBody>
+            <a:bodyPr rtlCol="0" anchor="ctr"/>
+            <a:lstStyle/>
+            <a:p>
+              <a:pPr algn="ctr"/>
+              <a:r>
+                <a:rPr lang="en-US" sz="1050" dirty="0"/>
+                <a:t>hospitals</a:t>
+              </a:r>
+            </a:p>
+          </p:txBody>
+        </p:sp>
+      </p:grpSp>
+      <p:grpSp>
+        <p:nvGrpSpPr>
+          <p:cNvPr id="8" name="Group 7"/>
+          <p:cNvGrpSpPr/>
+          <p:nvPr/>
+        </p:nvGrpSpPr>
+        <p:grpSpPr>
+          <a:xfrm>
+            <a:off x="9056253" y="2365754"/>
+            <a:ext cx="1745673" cy="2207491"/>
+            <a:chOff x="4091708" y="1958109"/>
+            <a:chExt cx="2105892" cy="2530763"/>
+          </a:xfrm>
+        </p:grpSpPr>
+        <p:sp>
+          <p:nvSpPr>
+            <p:cNvPr id="9" name="Rectangle 8"/>
+            <p:cNvSpPr/>
+            <p:nvPr/>
+          </p:nvSpPr>
+          <p:spPr>
+            <a:xfrm>
+              <a:off x="4091710" y="2346035"/>
+              <a:ext cx="2105890" cy="2142837"/>
+            </a:xfrm>
+            <a:prstGeom prst="rect">
+              <a:avLst/>
+            </a:prstGeom>
+            <a:solidFill>
+              <a:schemeClr val="bg1"/>
+            </a:solidFill>
+            <a:ln>
+              <a:solidFill>
+                <a:schemeClr val="tx1"/>
+              </a:solidFill>
+            </a:ln>
+          </p:spPr>
+          <p:style>
+            <a:lnRef idx="2">
+              <a:schemeClr val="accent1">
+                <a:shade val="50000"/>
+              </a:schemeClr>
+            </a:lnRef>
+            <a:fillRef idx="1">
+              <a:schemeClr val="accent1"/>
+            </a:fillRef>
+            <a:effectRef idx="0">
+              <a:schemeClr val="accent1"/>
+            </a:effectRef>
+            <a:fontRef idx="minor">
+              <a:schemeClr val="lt1"/>
+            </a:fontRef>
+          </p:style>
+          <p:txBody>
+            <a:bodyPr rtlCol="0" anchor="t"/>
+            <a:lstStyle/>
+            <a:p>
+              <a:pPr marL="285750" indent="-285750">
+                <a:buFont typeface="Arial" panose="020B0604020202020204" pitchFamily="34" charset="0"/>
+                <a:buChar char="•"/>
+              </a:pPr>
+              <a:r>
+                <a:rPr lang="en-US" sz="1050" dirty="0" err="1">
+                  <a:solidFill>
+                    <a:schemeClr val="tx1"/>
+                  </a:solidFill>
+                </a:rPr>
+                <a:t>hospital_id</a:t>
+              </a:r>
+              <a:endParaRPr lang="en-US" sz="1050" dirty="0">
+                <a:solidFill>
+                  <a:schemeClr val="tx1"/>
+                </a:solidFill>
+              </a:endParaRPr>
+            </a:p>
+            <a:p>
+              <a:pPr marL="285750" indent="-285750">
+                <a:buFont typeface="Arial" panose="020B0604020202020204" pitchFamily="34" charset="0"/>
+                <a:buChar char="•"/>
+              </a:pPr>
+              <a:r>
+                <a:rPr lang="en-US" sz="1050" dirty="0" err="1">
+                  <a:solidFill>
+                    <a:schemeClr val="tx1"/>
+                  </a:solidFill>
+                </a:rPr>
+                <a:t>hospital_name</a:t>
+              </a:r>
+              <a:endParaRPr lang="en-US" sz="1050" dirty="0">
+                <a:solidFill>
+                  <a:schemeClr val="tx1"/>
+                </a:solidFill>
+              </a:endParaRPr>
+            </a:p>
+            <a:p>
+              <a:pPr marL="285750" indent="-285750">
+                <a:buFont typeface="Arial" panose="020B0604020202020204" pitchFamily="34" charset="0"/>
+                <a:buChar char="•"/>
+              </a:pPr>
+              <a:r>
+                <a:rPr lang="en-US" sz="1050" dirty="0">
+                  <a:solidFill>
+                    <a:schemeClr val="tx1"/>
+                  </a:solidFill>
+                </a:rPr>
+                <a:t>address</a:t>
+              </a:r>
+            </a:p>
+            <a:p>
+              <a:pPr marL="285750" indent="-285750">
+                <a:buFont typeface="Arial" panose="020B0604020202020204" pitchFamily="34" charset="0"/>
+                <a:buChar char="•"/>
+              </a:pPr>
+              <a:r>
+                <a:rPr lang="en-US" sz="1050" dirty="0">
+                  <a:solidFill>
+                    <a:schemeClr val="tx1"/>
+                  </a:solidFill>
+                </a:rPr>
+                <a:t>city</a:t>
+              </a:r>
+            </a:p>
+            <a:p>
+              <a:pPr marL="285750" indent="-285750">
+                <a:buFont typeface="Arial" panose="020B0604020202020204" pitchFamily="34" charset="0"/>
+                <a:buChar char="•"/>
+              </a:pPr>
+              <a:r>
+                <a:rPr lang="en-US" sz="1050" dirty="0">
+                  <a:solidFill>
+                    <a:schemeClr val="tx1"/>
+                  </a:solidFill>
+                </a:rPr>
+                <a:t>state</a:t>
+              </a:r>
+            </a:p>
+            <a:p>
+              <a:pPr marL="285750" indent="-285750">
+                <a:buFont typeface="Arial" panose="020B0604020202020204" pitchFamily="34" charset="0"/>
+                <a:buChar char="•"/>
+              </a:pPr>
+              <a:r>
+                <a:rPr lang="en-US" sz="1050" dirty="0" err="1">
+                  <a:solidFill>
+                    <a:schemeClr val="tx1"/>
+                  </a:solidFill>
+                </a:rPr>
+                <a:t>zip_code</a:t>
+              </a:r>
+              <a:endParaRPr lang="en-US" sz="1050" dirty="0">
+                <a:solidFill>
+                  <a:schemeClr val="tx1"/>
+                </a:solidFill>
+              </a:endParaRPr>
+            </a:p>
+            <a:p>
+              <a:pPr marL="285750" indent="-285750">
+                <a:buFont typeface="Arial" panose="020B0604020202020204" pitchFamily="34" charset="0"/>
+                <a:buChar char="•"/>
+              </a:pPr>
+              <a:r>
+                <a:rPr lang="en-US" sz="1050" dirty="0" err="1">
+                  <a:solidFill>
+                    <a:schemeClr val="tx1"/>
+                  </a:solidFill>
+                </a:rPr>
+                <a:t>county_name</a:t>
+              </a:r>
+              <a:endParaRPr lang="en-US" sz="1050" dirty="0">
+                <a:solidFill>
+                  <a:schemeClr val="tx1"/>
+                </a:solidFill>
+              </a:endParaRPr>
+            </a:p>
+            <a:p>
+              <a:pPr marL="285750" indent="-285750">
+                <a:buFont typeface="Arial" panose="020B0604020202020204" pitchFamily="34" charset="0"/>
+                <a:buChar char="•"/>
+              </a:pPr>
+              <a:r>
+                <a:rPr lang="en-US" sz="1050" dirty="0" err="1">
+                  <a:solidFill>
+                    <a:schemeClr val="tx1"/>
+                  </a:solidFill>
+                </a:rPr>
+                <a:t>phone_number</a:t>
+              </a:r>
+              <a:endParaRPr lang="en-US" sz="1050" dirty="0">
+                <a:solidFill>
+                  <a:schemeClr val="tx1"/>
+                </a:solidFill>
+              </a:endParaRPr>
+            </a:p>
+            <a:p>
+              <a:pPr marL="285750" indent="-285750">
+                <a:buFont typeface="Arial" panose="020B0604020202020204" pitchFamily="34" charset="0"/>
+                <a:buChar char="•"/>
+              </a:pPr>
+              <a:r>
+                <a:rPr lang="en-US" sz="1050" dirty="0" err="1">
+                  <a:solidFill>
+                    <a:schemeClr val="tx1"/>
+                  </a:solidFill>
+                </a:rPr>
+                <a:t>hospital_type</a:t>
+              </a:r>
+              <a:endParaRPr lang="en-US" sz="1050" dirty="0">
+                <a:solidFill>
+                  <a:schemeClr val="tx1"/>
+                </a:solidFill>
+              </a:endParaRPr>
+            </a:p>
+            <a:p>
+              <a:pPr marL="285750" indent="-285750">
+                <a:buFont typeface="Arial" panose="020B0604020202020204" pitchFamily="34" charset="0"/>
+                <a:buChar char="•"/>
+              </a:pPr>
+              <a:r>
+                <a:rPr lang="en-US" sz="1050" dirty="0" err="1">
+                  <a:solidFill>
+                    <a:schemeClr val="tx1"/>
+                  </a:solidFill>
+                </a:rPr>
+                <a:t>hospital_ownership</a:t>
+              </a:r>
+              <a:endParaRPr lang="en-US" sz="1050" dirty="0">
+                <a:solidFill>
+                  <a:schemeClr val="tx1"/>
+                </a:solidFill>
+              </a:endParaRPr>
+            </a:p>
+            <a:p>
+              <a:pPr marL="285750" indent="-285750">
+                <a:buFont typeface="Arial" panose="020B0604020202020204" pitchFamily="34" charset="0"/>
+                <a:buChar char="•"/>
+              </a:pPr>
+              <a:r>
+                <a:rPr lang="en-US" sz="1050" dirty="0" err="1">
+                  <a:solidFill>
+                    <a:schemeClr val="tx1"/>
+                  </a:solidFill>
+                </a:rPr>
+                <a:t>emergency_services</a:t>
+              </a:r>
+              <a:endParaRPr lang="en-US" sz="1050" dirty="0">
+                <a:solidFill>
+                  <a:schemeClr val="tx1"/>
+                </a:solidFill>
+              </a:endParaRPr>
+            </a:p>
+          </p:txBody>
+        </p:sp>
+        <p:sp>
+          <p:nvSpPr>
+            <p:cNvPr id="10" name="Rectangle 9"/>
+            <p:cNvSpPr/>
+            <p:nvPr/>
+          </p:nvSpPr>
+          <p:spPr>
+            <a:xfrm>
+              <a:off x="4091708" y="1958109"/>
+              <a:ext cx="2105891" cy="387927"/>
+            </a:xfrm>
+            <a:prstGeom prst="rect">
+              <a:avLst/>
+            </a:prstGeom>
+            <a:ln>
+              <a:solidFill>
+                <a:schemeClr val="tx1"/>
+              </a:solidFill>
+            </a:ln>
+          </p:spPr>
+          <p:style>
+            <a:lnRef idx="2">
+              <a:schemeClr val="accent1">
+                <a:shade val="50000"/>
+              </a:schemeClr>
+            </a:lnRef>
+            <a:fillRef idx="1">
+              <a:schemeClr val="accent1"/>
+            </a:fillRef>
+            <a:effectRef idx="0">
+              <a:schemeClr val="accent1"/>
+            </a:effectRef>
+            <a:fontRef idx="minor">
+              <a:schemeClr val="lt1"/>
+            </a:fontRef>
+          </p:style>
+          <p:txBody>
+            <a:bodyPr rtlCol="0" anchor="ctr"/>
+            <a:lstStyle/>
+            <a:p>
+              <a:pPr algn="ctr"/>
+              <a:r>
+                <a:rPr lang="en-US" sz="1050" dirty="0"/>
+                <a:t>hospitals</a:t>
+              </a:r>
+            </a:p>
+          </p:txBody>
+        </p:sp>
+      </p:grpSp>
+      <p:grpSp>
+        <p:nvGrpSpPr>
+          <p:cNvPr id="11" name="Group 10"/>
+          <p:cNvGrpSpPr/>
+          <p:nvPr/>
+        </p:nvGrpSpPr>
+        <p:grpSpPr>
+          <a:xfrm>
+            <a:off x="798943" y="4627417"/>
+            <a:ext cx="1745673" cy="2207491"/>
+            <a:chOff x="4091708" y="1958109"/>
+            <a:chExt cx="2105892" cy="2530763"/>
+          </a:xfrm>
+        </p:grpSpPr>
+        <p:sp>
+          <p:nvSpPr>
+            <p:cNvPr id="12" name="Rectangle 11"/>
+            <p:cNvSpPr/>
+            <p:nvPr/>
+          </p:nvSpPr>
+          <p:spPr>
+            <a:xfrm>
+              <a:off x="4091710" y="2346035"/>
+              <a:ext cx="2105890" cy="2142837"/>
+            </a:xfrm>
+            <a:prstGeom prst="rect">
+              <a:avLst/>
+            </a:prstGeom>
+            <a:solidFill>
+              <a:schemeClr val="bg1"/>
+            </a:solidFill>
+            <a:ln>
+              <a:solidFill>
+                <a:schemeClr val="tx1"/>
+              </a:solidFill>
+            </a:ln>
+          </p:spPr>
+          <p:style>
+            <a:lnRef idx="2">
+              <a:schemeClr val="accent1">
+                <a:shade val="50000"/>
+              </a:schemeClr>
+            </a:lnRef>
+            <a:fillRef idx="1">
+              <a:schemeClr val="accent1"/>
+            </a:fillRef>
+            <a:effectRef idx="0">
+              <a:schemeClr val="accent1"/>
+            </a:effectRef>
+            <a:fontRef idx="minor">
+              <a:schemeClr val="lt1"/>
+            </a:fontRef>
+          </p:style>
+          <p:txBody>
+            <a:bodyPr rtlCol="0" anchor="t"/>
+            <a:lstStyle/>
+            <a:p>
+              <a:pPr marL="285750" indent="-285750">
+                <a:buFont typeface="Arial" panose="020B0604020202020204" pitchFamily="34" charset="0"/>
+                <a:buChar char="•"/>
+              </a:pPr>
+              <a:r>
+                <a:rPr lang="en-US" sz="1050" dirty="0" err="1">
+                  <a:solidFill>
+                    <a:schemeClr val="tx1"/>
+                  </a:solidFill>
+                </a:rPr>
+                <a:t>hospital_id</a:t>
+              </a:r>
+              <a:endParaRPr lang="en-US" sz="1050" dirty="0">
+                <a:solidFill>
+                  <a:schemeClr val="tx1"/>
+                </a:solidFill>
+              </a:endParaRPr>
+            </a:p>
+            <a:p>
+              <a:pPr marL="285750" indent="-285750">
+                <a:buFont typeface="Arial" panose="020B0604020202020204" pitchFamily="34" charset="0"/>
+                <a:buChar char="•"/>
+              </a:pPr>
+              <a:r>
+                <a:rPr lang="en-US" sz="1050" dirty="0" err="1">
+                  <a:solidFill>
+                    <a:schemeClr val="tx1"/>
+                  </a:solidFill>
+                </a:rPr>
+                <a:t>hospital_name</a:t>
+              </a:r>
+              <a:endParaRPr lang="en-US" sz="1050" dirty="0">
+                <a:solidFill>
+                  <a:schemeClr val="tx1"/>
+                </a:solidFill>
+              </a:endParaRPr>
+            </a:p>
+            <a:p>
+              <a:pPr marL="285750" indent="-285750">
+                <a:buFont typeface="Arial" panose="020B0604020202020204" pitchFamily="34" charset="0"/>
+                <a:buChar char="•"/>
+              </a:pPr>
+              <a:r>
+                <a:rPr lang="en-US" sz="1050" dirty="0">
+                  <a:solidFill>
+                    <a:schemeClr val="tx1"/>
+                  </a:solidFill>
+                </a:rPr>
+                <a:t>address</a:t>
+              </a:r>
+            </a:p>
+            <a:p>
+              <a:pPr marL="285750" indent="-285750">
+                <a:buFont typeface="Arial" panose="020B0604020202020204" pitchFamily="34" charset="0"/>
+                <a:buChar char="•"/>
+              </a:pPr>
+              <a:r>
+                <a:rPr lang="en-US" sz="1050" dirty="0">
+                  <a:solidFill>
+                    <a:schemeClr val="tx1"/>
+                  </a:solidFill>
+                </a:rPr>
+                <a:t>city</a:t>
+              </a:r>
+            </a:p>
+            <a:p>
+              <a:pPr marL="285750" indent="-285750">
+                <a:buFont typeface="Arial" panose="020B0604020202020204" pitchFamily="34" charset="0"/>
+                <a:buChar char="•"/>
+              </a:pPr>
+              <a:r>
+                <a:rPr lang="en-US" sz="1050" dirty="0">
+                  <a:solidFill>
+                    <a:schemeClr val="tx1"/>
+                  </a:solidFill>
+                </a:rPr>
+                <a:t>state</a:t>
+              </a:r>
+            </a:p>
+            <a:p>
+              <a:pPr marL="285750" indent="-285750">
+                <a:buFont typeface="Arial" panose="020B0604020202020204" pitchFamily="34" charset="0"/>
+                <a:buChar char="•"/>
+              </a:pPr>
+              <a:r>
+                <a:rPr lang="en-US" sz="1050" dirty="0" err="1">
+                  <a:solidFill>
+                    <a:schemeClr val="tx1"/>
+                  </a:solidFill>
+                </a:rPr>
+                <a:t>zip_code</a:t>
+              </a:r>
+              <a:endParaRPr lang="en-US" sz="1050" dirty="0">
+                <a:solidFill>
+                  <a:schemeClr val="tx1"/>
+                </a:solidFill>
+              </a:endParaRPr>
+            </a:p>
+            <a:p>
+              <a:pPr marL="285750" indent="-285750">
+                <a:buFont typeface="Arial" panose="020B0604020202020204" pitchFamily="34" charset="0"/>
+                <a:buChar char="•"/>
+              </a:pPr>
+              <a:r>
+                <a:rPr lang="en-US" sz="1050" dirty="0" err="1">
+                  <a:solidFill>
+                    <a:schemeClr val="tx1"/>
+                  </a:solidFill>
+                </a:rPr>
+                <a:t>county_name</a:t>
+              </a:r>
+              <a:endParaRPr lang="en-US" sz="1050" dirty="0">
+                <a:solidFill>
+                  <a:schemeClr val="tx1"/>
+                </a:solidFill>
+              </a:endParaRPr>
+            </a:p>
+            <a:p>
+              <a:pPr marL="285750" indent="-285750">
+                <a:buFont typeface="Arial" panose="020B0604020202020204" pitchFamily="34" charset="0"/>
+                <a:buChar char="•"/>
+              </a:pPr>
+              <a:r>
+                <a:rPr lang="en-US" sz="1050" dirty="0" err="1">
+                  <a:solidFill>
+                    <a:schemeClr val="tx1"/>
+                  </a:solidFill>
+                </a:rPr>
+                <a:t>phone_number</a:t>
+              </a:r>
+              <a:endParaRPr lang="en-US" sz="1050" dirty="0">
+                <a:solidFill>
+                  <a:schemeClr val="tx1"/>
+                </a:solidFill>
+              </a:endParaRPr>
+            </a:p>
+            <a:p>
+              <a:pPr marL="285750" indent="-285750">
+                <a:buFont typeface="Arial" panose="020B0604020202020204" pitchFamily="34" charset="0"/>
+                <a:buChar char="•"/>
+              </a:pPr>
+              <a:r>
+                <a:rPr lang="en-US" sz="1050" dirty="0" err="1">
+                  <a:solidFill>
+                    <a:schemeClr val="tx1"/>
+                  </a:solidFill>
+                </a:rPr>
+                <a:t>hospital_type</a:t>
+              </a:r>
+              <a:endParaRPr lang="en-US" sz="1050" dirty="0">
+                <a:solidFill>
+                  <a:schemeClr val="tx1"/>
+                </a:solidFill>
+              </a:endParaRPr>
+            </a:p>
+            <a:p>
+              <a:pPr marL="285750" indent="-285750">
+                <a:buFont typeface="Arial" panose="020B0604020202020204" pitchFamily="34" charset="0"/>
+                <a:buChar char="•"/>
+              </a:pPr>
+              <a:r>
+                <a:rPr lang="en-US" sz="1050" dirty="0" err="1">
+                  <a:solidFill>
+                    <a:schemeClr val="tx1"/>
+                  </a:solidFill>
+                </a:rPr>
+                <a:t>hospital_ownership</a:t>
+              </a:r>
+              <a:endParaRPr lang="en-US" sz="1050" dirty="0">
+                <a:solidFill>
+                  <a:schemeClr val="tx1"/>
+                </a:solidFill>
+              </a:endParaRPr>
+            </a:p>
+            <a:p>
+              <a:pPr marL="285750" indent="-285750">
+                <a:buFont typeface="Arial" panose="020B0604020202020204" pitchFamily="34" charset="0"/>
+                <a:buChar char="•"/>
+              </a:pPr>
+              <a:r>
+                <a:rPr lang="en-US" sz="1050" dirty="0" err="1">
+                  <a:solidFill>
+                    <a:schemeClr val="tx1"/>
+                  </a:solidFill>
+                </a:rPr>
+                <a:t>emergency_services</a:t>
+              </a:r>
+              <a:endParaRPr lang="en-US" sz="1050" dirty="0">
+                <a:solidFill>
+                  <a:schemeClr val="tx1"/>
+                </a:solidFill>
+              </a:endParaRPr>
+            </a:p>
+          </p:txBody>
+        </p:sp>
+        <p:sp>
+          <p:nvSpPr>
+            <p:cNvPr id="13" name="Rectangle 12"/>
+            <p:cNvSpPr/>
+            <p:nvPr/>
+          </p:nvSpPr>
+          <p:spPr>
+            <a:xfrm>
+              <a:off x="4091708" y="1958109"/>
+              <a:ext cx="2105891" cy="387927"/>
+            </a:xfrm>
+            <a:prstGeom prst="rect">
+              <a:avLst/>
+            </a:prstGeom>
+            <a:ln>
+              <a:solidFill>
+                <a:schemeClr val="tx1"/>
+              </a:solidFill>
+            </a:ln>
+          </p:spPr>
+          <p:style>
+            <a:lnRef idx="2">
+              <a:schemeClr val="accent1">
+                <a:shade val="50000"/>
+              </a:schemeClr>
+            </a:lnRef>
+            <a:fillRef idx="1">
+              <a:schemeClr val="accent1"/>
+            </a:fillRef>
+            <a:effectRef idx="0">
+              <a:schemeClr val="accent1"/>
+            </a:effectRef>
+            <a:fontRef idx="minor">
+              <a:schemeClr val="lt1"/>
+            </a:fontRef>
+          </p:style>
+          <p:txBody>
+            <a:bodyPr rtlCol="0" anchor="ctr"/>
+            <a:lstStyle/>
+            <a:p>
+              <a:pPr algn="ctr"/>
+              <a:r>
+                <a:rPr lang="en-US" sz="1050" dirty="0"/>
+                <a:t>hospitals</a:t>
+              </a:r>
+            </a:p>
+          </p:txBody>
+        </p:sp>
+      </p:grpSp>
+      <p:grpSp>
+        <p:nvGrpSpPr>
+          <p:cNvPr id="14" name="Group 13"/>
+          <p:cNvGrpSpPr/>
+          <p:nvPr/>
+        </p:nvGrpSpPr>
+        <p:grpSpPr>
+          <a:xfrm>
+            <a:off x="798942" y="2365754"/>
+            <a:ext cx="1745673" cy="2207491"/>
+            <a:chOff x="4091708" y="1958109"/>
+            <a:chExt cx="2105892" cy="2530763"/>
+          </a:xfrm>
+        </p:grpSpPr>
+        <p:sp>
+          <p:nvSpPr>
+            <p:cNvPr id="15" name="Rectangle 14"/>
+            <p:cNvSpPr/>
+            <p:nvPr/>
+          </p:nvSpPr>
+          <p:spPr>
+            <a:xfrm>
+              <a:off x="4091710" y="2346035"/>
+              <a:ext cx="2105890" cy="2142837"/>
+            </a:xfrm>
+            <a:prstGeom prst="rect">
+              <a:avLst/>
+            </a:prstGeom>
+            <a:solidFill>
+              <a:schemeClr val="bg1"/>
+            </a:solidFill>
+            <a:ln>
+              <a:solidFill>
+                <a:schemeClr val="tx1"/>
+              </a:solidFill>
+            </a:ln>
+          </p:spPr>
+          <p:style>
+            <a:lnRef idx="2">
+              <a:schemeClr val="accent1">
+                <a:shade val="50000"/>
+              </a:schemeClr>
+            </a:lnRef>
+            <a:fillRef idx="1">
+              <a:schemeClr val="accent1"/>
+            </a:fillRef>
+            <a:effectRef idx="0">
+              <a:schemeClr val="accent1"/>
+            </a:effectRef>
+            <a:fontRef idx="minor">
+              <a:schemeClr val="lt1"/>
+            </a:fontRef>
+          </p:style>
+          <p:txBody>
+            <a:bodyPr rtlCol="0" anchor="t"/>
+            <a:lstStyle/>
+            <a:p>
+              <a:pPr marL="285750" indent="-285750">
+                <a:buFont typeface="Arial" panose="020B0604020202020204" pitchFamily="34" charset="0"/>
+                <a:buChar char="•"/>
+              </a:pPr>
+              <a:r>
+                <a:rPr lang="en-US" sz="1050" dirty="0" err="1">
+                  <a:solidFill>
+                    <a:schemeClr val="tx1"/>
+                  </a:solidFill>
+                </a:rPr>
+                <a:t>hospital_id</a:t>
+              </a:r>
+              <a:endParaRPr lang="en-US" sz="1050" dirty="0">
+                <a:solidFill>
+                  <a:schemeClr val="tx1"/>
+                </a:solidFill>
+              </a:endParaRPr>
+            </a:p>
+            <a:p>
+              <a:pPr marL="285750" indent="-285750">
+                <a:buFont typeface="Arial" panose="020B0604020202020204" pitchFamily="34" charset="0"/>
+                <a:buChar char="•"/>
+              </a:pPr>
+              <a:r>
+                <a:rPr lang="en-US" sz="1050" dirty="0" err="1">
+                  <a:solidFill>
+                    <a:schemeClr val="tx1"/>
+                  </a:solidFill>
+                </a:rPr>
+                <a:t>hospital_name</a:t>
+              </a:r>
+              <a:endParaRPr lang="en-US" sz="1050" dirty="0">
+                <a:solidFill>
+                  <a:schemeClr val="tx1"/>
+                </a:solidFill>
+              </a:endParaRPr>
+            </a:p>
+            <a:p>
+              <a:pPr marL="285750" indent="-285750">
+                <a:buFont typeface="Arial" panose="020B0604020202020204" pitchFamily="34" charset="0"/>
+                <a:buChar char="•"/>
+              </a:pPr>
+              <a:r>
+                <a:rPr lang="en-US" sz="1050" dirty="0">
+                  <a:solidFill>
+                    <a:schemeClr val="tx1"/>
+                  </a:solidFill>
+                </a:rPr>
+                <a:t>address</a:t>
+              </a:r>
+            </a:p>
+            <a:p>
+              <a:pPr marL="285750" indent="-285750">
+                <a:buFont typeface="Arial" panose="020B0604020202020204" pitchFamily="34" charset="0"/>
+                <a:buChar char="•"/>
+              </a:pPr>
+              <a:r>
+                <a:rPr lang="en-US" sz="1050" dirty="0">
+                  <a:solidFill>
+                    <a:schemeClr val="tx1"/>
+                  </a:solidFill>
+                </a:rPr>
+                <a:t>city</a:t>
+              </a:r>
+            </a:p>
+            <a:p>
+              <a:pPr marL="285750" indent="-285750">
+                <a:buFont typeface="Arial" panose="020B0604020202020204" pitchFamily="34" charset="0"/>
+                <a:buChar char="•"/>
+              </a:pPr>
+              <a:r>
+                <a:rPr lang="en-US" sz="1050" dirty="0">
+                  <a:solidFill>
+                    <a:schemeClr val="tx1"/>
+                  </a:solidFill>
+                </a:rPr>
+                <a:t>state</a:t>
+              </a:r>
+            </a:p>
+            <a:p>
+              <a:pPr marL="285750" indent="-285750">
+                <a:buFont typeface="Arial" panose="020B0604020202020204" pitchFamily="34" charset="0"/>
+                <a:buChar char="•"/>
+              </a:pPr>
+              <a:r>
+                <a:rPr lang="en-US" sz="1050" dirty="0" err="1">
+                  <a:solidFill>
+                    <a:schemeClr val="tx1"/>
+                  </a:solidFill>
+                </a:rPr>
+                <a:t>zip_code</a:t>
+              </a:r>
+              <a:endParaRPr lang="en-US" sz="1050" dirty="0">
+                <a:solidFill>
+                  <a:schemeClr val="tx1"/>
+                </a:solidFill>
+              </a:endParaRPr>
+            </a:p>
+            <a:p>
+              <a:pPr marL="285750" indent="-285750">
+                <a:buFont typeface="Arial" panose="020B0604020202020204" pitchFamily="34" charset="0"/>
+                <a:buChar char="•"/>
+              </a:pPr>
+              <a:r>
+                <a:rPr lang="en-US" sz="1050" dirty="0" err="1">
+                  <a:solidFill>
+                    <a:schemeClr val="tx1"/>
+                  </a:solidFill>
+                </a:rPr>
+                <a:t>county_name</a:t>
+              </a:r>
+              <a:endParaRPr lang="en-US" sz="1050" dirty="0">
+                <a:solidFill>
+                  <a:schemeClr val="tx1"/>
+                </a:solidFill>
+              </a:endParaRPr>
+            </a:p>
+            <a:p>
+              <a:pPr marL="285750" indent="-285750">
+                <a:buFont typeface="Arial" panose="020B0604020202020204" pitchFamily="34" charset="0"/>
+                <a:buChar char="•"/>
+              </a:pPr>
+              <a:r>
+                <a:rPr lang="en-US" sz="1050" dirty="0" err="1">
+                  <a:solidFill>
+                    <a:schemeClr val="tx1"/>
+                  </a:solidFill>
+                </a:rPr>
+                <a:t>phone_number</a:t>
+              </a:r>
+              <a:endParaRPr lang="en-US" sz="1050" dirty="0">
+                <a:solidFill>
+                  <a:schemeClr val="tx1"/>
+                </a:solidFill>
+              </a:endParaRPr>
+            </a:p>
+            <a:p>
+              <a:pPr marL="285750" indent="-285750">
+                <a:buFont typeface="Arial" panose="020B0604020202020204" pitchFamily="34" charset="0"/>
+                <a:buChar char="•"/>
+              </a:pPr>
+              <a:r>
+                <a:rPr lang="en-US" sz="1050" dirty="0" err="1">
+                  <a:solidFill>
+                    <a:schemeClr val="tx1"/>
+                  </a:solidFill>
+                </a:rPr>
+                <a:t>hospital_type</a:t>
+              </a:r>
+              <a:endParaRPr lang="en-US" sz="1050" dirty="0">
+                <a:solidFill>
+                  <a:schemeClr val="tx1"/>
+                </a:solidFill>
+              </a:endParaRPr>
+            </a:p>
+            <a:p>
+              <a:pPr marL="285750" indent="-285750">
+                <a:buFont typeface="Arial" panose="020B0604020202020204" pitchFamily="34" charset="0"/>
+                <a:buChar char="•"/>
+              </a:pPr>
+              <a:r>
+                <a:rPr lang="en-US" sz="1050" dirty="0" err="1">
+                  <a:solidFill>
+                    <a:schemeClr val="tx1"/>
+                  </a:solidFill>
+                </a:rPr>
+                <a:t>hospital_ownership</a:t>
+              </a:r>
+              <a:endParaRPr lang="en-US" sz="1050" dirty="0">
+                <a:solidFill>
+                  <a:schemeClr val="tx1"/>
+                </a:solidFill>
+              </a:endParaRPr>
+            </a:p>
+            <a:p>
+              <a:pPr marL="285750" indent="-285750">
+                <a:buFont typeface="Arial" panose="020B0604020202020204" pitchFamily="34" charset="0"/>
+                <a:buChar char="•"/>
+              </a:pPr>
+              <a:r>
+                <a:rPr lang="en-US" sz="1050" dirty="0" err="1">
+                  <a:solidFill>
+                    <a:schemeClr val="tx1"/>
+                  </a:solidFill>
+                </a:rPr>
+                <a:t>emergency_services</a:t>
+              </a:r>
+              <a:endParaRPr lang="en-US" sz="1050" dirty="0">
+                <a:solidFill>
+                  <a:schemeClr val="tx1"/>
+                </a:solidFill>
+              </a:endParaRPr>
+            </a:p>
+          </p:txBody>
+        </p:sp>
+        <p:sp>
+          <p:nvSpPr>
+            <p:cNvPr id="16" name="Rectangle 15"/>
+            <p:cNvSpPr/>
+            <p:nvPr/>
+          </p:nvSpPr>
+          <p:spPr>
+            <a:xfrm>
+              <a:off x="4091708" y="1958109"/>
+              <a:ext cx="2105891" cy="387927"/>
+            </a:xfrm>
+            <a:prstGeom prst="rect">
+              <a:avLst/>
+            </a:prstGeom>
+            <a:ln>
+              <a:solidFill>
+                <a:schemeClr val="tx1"/>
+              </a:solidFill>
+            </a:ln>
+          </p:spPr>
+          <p:style>
+            <a:lnRef idx="2">
+              <a:schemeClr val="accent1">
+                <a:shade val="50000"/>
+              </a:schemeClr>
+            </a:lnRef>
+            <a:fillRef idx="1">
+              <a:schemeClr val="accent1"/>
+            </a:fillRef>
+            <a:effectRef idx="0">
+              <a:schemeClr val="accent1"/>
+            </a:effectRef>
+            <a:fontRef idx="minor">
+              <a:schemeClr val="lt1"/>
+            </a:fontRef>
+          </p:style>
+          <p:txBody>
+            <a:bodyPr rtlCol="0" anchor="ctr"/>
+            <a:lstStyle/>
+            <a:p>
+              <a:pPr algn="ctr"/>
+              <a:r>
+                <a:rPr lang="en-US" sz="1050" dirty="0"/>
+                <a:t>hospitals</a:t>
+              </a:r>
+            </a:p>
+          </p:txBody>
+        </p:sp>
+      </p:grpSp>
+      <p:grpSp>
+        <p:nvGrpSpPr>
+          <p:cNvPr id="17" name="Group 16"/>
+          <p:cNvGrpSpPr/>
+          <p:nvPr/>
+        </p:nvGrpSpPr>
+        <p:grpSpPr>
+          <a:xfrm>
+            <a:off x="798942" y="104091"/>
+            <a:ext cx="1745673" cy="2207491"/>
+            <a:chOff x="4091708" y="1958109"/>
+            <a:chExt cx="2105892" cy="2530763"/>
+          </a:xfrm>
+        </p:grpSpPr>
+        <p:sp>
+          <p:nvSpPr>
+            <p:cNvPr id="18" name="Rectangle 17"/>
+            <p:cNvSpPr/>
+            <p:nvPr/>
+          </p:nvSpPr>
+          <p:spPr>
+            <a:xfrm>
+              <a:off x="4091710" y="2346035"/>
+              <a:ext cx="2105890" cy="2142837"/>
+            </a:xfrm>
+            <a:prstGeom prst="rect">
+              <a:avLst/>
+            </a:prstGeom>
+            <a:solidFill>
+              <a:schemeClr val="bg1"/>
+            </a:solidFill>
+            <a:ln>
+              <a:solidFill>
+                <a:schemeClr val="tx1"/>
+              </a:solidFill>
+            </a:ln>
+          </p:spPr>
+          <p:style>
+            <a:lnRef idx="2">
+              <a:schemeClr val="accent1">
+                <a:shade val="50000"/>
+              </a:schemeClr>
+            </a:lnRef>
+            <a:fillRef idx="1">
+              <a:schemeClr val="accent1"/>
+            </a:fillRef>
+            <a:effectRef idx="0">
+              <a:schemeClr val="accent1"/>
+            </a:effectRef>
+            <a:fontRef idx="minor">
+              <a:schemeClr val="lt1"/>
+            </a:fontRef>
+          </p:style>
+          <p:txBody>
+            <a:bodyPr rtlCol="0" anchor="t"/>
+            <a:lstStyle/>
+            <a:p>
+              <a:pPr marL="285750" indent="-285750">
+                <a:buFont typeface="Arial" panose="020B0604020202020204" pitchFamily="34" charset="0"/>
+                <a:buChar char="•"/>
+              </a:pPr>
+              <a:r>
+                <a:rPr lang="en-US" sz="1050" dirty="0" err="1">
+                  <a:solidFill>
+                    <a:schemeClr val="tx1"/>
+                  </a:solidFill>
+                </a:rPr>
+                <a:t>hospital_id</a:t>
+              </a:r>
+              <a:endParaRPr lang="en-US" sz="1050" dirty="0">
+                <a:solidFill>
+                  <a:schemeClr val="tx1"/>
+                </a:solidFill>
+              </a:endParaRPr>
+            </a:p>
+            <a:p>
+              <a:pPr marL="285750" indent="-285750">
+                <a:buFont typeface="Arial" panose="020B0604020202020204" pitchFamily="34" charset="0"/>
+                <a:buChar char="•"/>
+              </a:pPr>
+              <a:r>
+                <a:rPr lang="en-US" sz="1050" dirty="0" err="1">
+                  <a:solidFill>
+                    <a:schemeClr val="tx1"/>
+                  </a:solidFill>
+                </a:rPr>
+                <a:t>hospital_name</a:t>
+              </a:r>
+              <a:endParaRPr lang="en-US" sz="1050" dirty="0">
+                <a:solidFill>
+                  <a:schemeClr val="tx1"/>
+                </a:solidFill>
+              </a:endParaRPr>
+            </a:p>
+            <a:p>
+              <a:pPr marL="285750" indent="-285750">
+                <a:buFont typeface="Arial" panose="020B0604020202020204" pitchFamily="34" charset="0"/>
+                <a:buChar char="•"/>
+              </a:pPr>
+              <a:r>
+                <a:rPr lang="en-US" sz="1050" dirty="0">
+                  <a:solidFill>
+                    <a:schemeClr val="tx1"/>
+                  </a:solidFill>
+                </a:rPr>
+                <a:t>address</a:t>
+              </a:r>
+            </a:p>
+            <a:p>
+              <a:pPr marL="285750" indent="-285750">
+                <a:buFont typeface="Arial" panose="020B0604020202020204" pitchFamily="34" charset="0"/>
+                <a:buChar char="•"/>
+              </a:pPr>
+              <a:r>
+                <a:rPr lang="en-US" sz="1050" dirty="0">
+                  <a:solidFill>
+                    <a:schemeClr val="tx1"/>
+                  </a:solidFill>
+                </a:rPr>
+                <a:t>city</a:t>
+              </a:r>
+            </a:p>
+            <a:p>
+              <a:pPr marL="285750" indent="-285750">
+                <a:buFont typeface="Arial" panose="020B0604020202020204" pitchFamily="34" charset="0"/>
+                <a:buChar char="•"/>
+              </a:pPr>
+              <a:r>
+                <a:rPr lang="en-US" sz="1050" dirty="0">
+                  <a:solidFill>
+                    <a:schemeClr val="tx1"/>
+                  </a:solidFill>
+                </a:rPr>
+                <a:t>state</a:t>
+              </a:r>
+            </a:p>
+            <a:p>
+              <a:pPr marL="285750" indent="-285750">
+                <a:buFont typeface="Arial" panose="020B0604020202020204" pitchFamily="34" charset="0"/>
+                <a:buChar char="•"/>
+              </a:pPr>
+              <a:r>
+                <a:rPr lang="en-US" sz="1050" dirty="0" err="1">
+                  <a:solidFill>
+                    <a:schemeClr val="tx1"/>
+                  </a:solidFill>
+                </a:rPr>
+                <a:t>zip_code</a:t>
+              </a:r>
+              <a:endParaRPr lang="en-US" sz="1050" dirty="0">
+                <a:solidFill>
+                  <a:schemeClr val="tx1"/>
+                </a:solidFill>
+              </a:endParaRPr>
+            </a:p>
+            <a:p>
+              <a:pPr marL="285750" indent="-285750">
+                <a:buFont typeface="Arial" panose="020B0604020202020204" pitchFamily="34" charset="0"/>
+                <a:buChar char="•"/>
+              </a:pPr>
+              <a:r>
+                <a:rPr lang="en-US" sz="1050" dirty="0" err="1">
+                  <a:solidFill>
+                    <a:schemeClr val="tx1"/>
+                  </a:solidFill>
+                </a:rPr>
+                <a:t>county_name</a:t>
+              </a:r>
+              <a:endParaRPr lang="en-US" sz="1050" dirty="0">
+                <a:solidFill>
+                  <a:schemeClr val="tx1"/>
+                </a:solidFill>
+              </a:endParaRPr>
+            </a:p>
+            <a:p>
+              <a:pPr marL="285750" indent="-285750">
+                <a:buFont typeface="Arial" panose="020B0604020202020204" pitchFamily="34" charset="0"/>
+                <a:buChar char="•"/>
+              </a:pPr>
+              <a:r>
+                <a:rPr lang="en-US" sz="1050" dirty="0" err="1">
+                  <a:solidFill>
+                    <a:schemeClr val="tx1"/>
+                  </a:solidFill>
+                </a:rPr>
+                <a:t>phone_number</a:t>
+              </a:r>
+              <a:endParaRPr lang="en-US" sz="1050" dirty="0">
+                <a:solidFill>
+                  <a:schemeClr val="tx1"/>
+                </a:solidFill>
+              </a:endParaRPr>
+            </a:p>
+            <a:p>
+              <a:pPr marL="285750" indent="-285750">
+                <a:buFont typeface="Arial" panose="020B0604020202020204" pitchFamily="34" charset="0"/>
+                <a:buChar char="•"/>
+              </a:pPr>
+              <a:r>
+                <a:rPr lang="en-US" sz="1050" dirty="0" err="1">
+                  <a:solidFill>
+                    <a:schemeClr val="tx1"/>
+                  </a:solidFill>
+                </a:rPr>
+                <a:t>hospital_type</a:t>
+              </a:r>
+              <a:endParaRPr lang="en-US" sz="1050" dirty="0">
+                <a:solidFill>
+                  <a:schemeClr val="tx1"/>
+                </a:solidFill>
+              </a:endParaRPr>
+            </a:p>
+            <a:p>
+              <a:pPr marL="285750" indent="-285750">
+                <a:buFont typeface="Arial" panose="020B0604020202020204" pitchFamily="34" charset="0"/>
+                <a:buChar char="•"/>
+              </a:pPr>
+              <a:r>
+                <a:rPr lang="en-US" sz="1050" dirty="0" err="1">
+                  <a:solidFill>
+                    <a:schemeClr val="tx1"/>
+                  </a:solidFill>
+                </a:rPr>
+                <a:t>hospital_ownership</a:t>
+              </a:r>
+              <a:endParaRPr lang="en-US" sz="1050" dirty="0">
+                <a:solidFill>
+                  <a:schemeClr val="tx1"/>
+                </a:solidFill>
+              </a:endParaRPr>
+            </a:p>
+            <a:p>
+              <a:pPr marL="285750" indent="-285750">
+                <a:buFont typeface="Arial" panose="020B0604020202020204" pitchFamily="34" charset="0"/>
+                <a:buChar char="•"/>
+              </a:pPr>
+              <a:r>
+                <a:rPr lang="en-US" sz="1050" dirty="0" err="1">
+                  <a:solidFill>
+                    <a:schemeClr val="tx1"/>
+                  </a:solidFill>
+                </a:rPr>
+                <a:t>emergency_services</a:t>
+              </a:r>
+              <a:endParaRPr lang="en-US" sz="1050" dirty="0">
+                <a:solidFill>
+                  <a:schemeClr val="tx1"/>
+                </a:solidFill>
+              </a:endParaRPr>
+            </a:p>
+          </p:txBody>
+        </p:sp>
+        <p:sp>
+          <p:nvSpPr>
+            <p:cNvPr id="19" name="Rectangle 18"/>
+            <p:cNvSpPr/>
+            <p:nvPr/>
+          </p:nvSpPr>
+          <p:spPr>
+            <a:xfrm>
+              <a:off x="4091708" y="1958109"/>
+              <a:ext cx="2105891" cy="387927"/>
+            </a:xfrm>
+            <a:prstGeom prst="rect">
+              <a:avLst/>
+            </a:prstGeom>
+            <a:ln>
+              <a:solidFill>
+                <a:schemeClr val="tx1"/>
+              </a:solidFill>
+            </a:ln>
+          </p:spPr>
+          <p:style>
+            <a:lnRef idx="2">
+              <a:schemeClr val="accent1">
+                <a:shade val="50000"/>
+              </a:schemeClr>
+            </a:lnRef>
+            <a:fillRef idx="1">
+              <a:schemeClr val="accent1"/>
+            </a:fillRef>
+            <a:effectRef idx="0">
+              <a:schemeClr val="accent1"/>
+            </a:effectRef>
+            <a:fontRef idx="minor">
+              <a:schemeClr val="lt1"/>
+            </a:fontRef>
+          </p:style>
+          <p:txBody>
+            <a:bodyPr rtlCol="0" anchor="ctr"/>
+            <a:lstStyle/>
+            <a:p>
+              <a:pPr algn="ctr"/>
+              <a:r>
+                <a:rPr lang="en-US" sz="1050" dirty="0"/>
+                <a:t>hospitals</a:t>
+              </a:r>
+            </a:p>
+          </p:txBody>
+        </p:sp>
+      </p:grpSp>
+      <p:grpSp>
+        <p:nvGrpSpPr>
+          <p:cNvPr id="20" name="Group 19"/>
+          <p:cNvGrpSpPr/>
+          <p:nvPr/>
+        </p:nvGrpSpPr>
+        <p:grpSpPr>
+          <a:xfrm>
+            <a:off x="9056253" y="4627417"/>
+            <a:ext cx="1745673" cy="2207491"/>
+            <a:chOff x="4091708" y="1958109"/>
+            <a:chExt cx="2105892" cy="2530763"/>
+          </a:xfrm>
+        </p:grpSpPr>
+        <p:sp>
+          <p:nvSpPr>
+            <p:cNvPr id="21" name="Rectangle 20"/>
+            <p:cNvSpPr/>
+            <p:nvPr/>
+          </p:nvSpPr>
+          <p:spPr>
+            <a:xfrm>
+              <a:off x="4091710" y="2346035"/>
+              <a:ext cx="2105890" cy="2142837"/>
+            </a:xfrm>
+            <a:prstGeom prst="rect">
+              <a:avLst/>
+            </a:prstGeom>
+            <a:solidFill>
+              <a:schemeClr val="bg1"/>
+            </a:solidFill>
+            <a:ln>
+              <a:solidFill>
+                <a:schemeClr val="tx1"/>
+              </a:solidFill>
+            </a:ln>
+          </p:spPr>
+          <p:style>
+            <a:lnRef idx="2">
+              <a:schemeClr val="accent1">
+                <a:shade val="50000"/>
+              </a:schemeClr>
+            </a:lnRef>
+            <a:fillRef idx="1">
+              <a:schemeClr val="accent1"/>
+            </a:fillRef>
+            <a:effectRef idx="0">
+              <a:schemeClr val="accent1"/>
+            </a:effectRef>
+            <a:fontRef idx="minor">
+              <a:schemeClr val="lt1"/>
+            </a:fontRef>
+          </p:style>
+          <p:txBody>
+            <a:bodyPr rtlCol="0" anchor="t"/>
+            <a:lstStyle/>
+            <a:p>
+              <a:pPr marL="285750" indent="-285750">
+                <a:buFont typeface="Arial" panose="020B0604020202020204" pitchFamily="34" charset="0"/>
+                <a:buChar char="•"/>
+              </a:pPr>
+              <a:r>
+                <a:rPr lang="en-US" sz="1050" dirty="0" err="1">
+                  <a:solidFill>
+                    <a:schemeClr val="tx1"/>
+                  </a:solidFill>
+                </a:rPr>
+                <a:t>hospital_id</a:t>
+              </a:r>
+              <a:endParaRPr lang="en-US" sz="1050" dirty="0">
+                <a:solidFill>
+                  <a:schemeClr val="tx1"/>
+                </a:solidFill>
+              </a:endParaRPr>
+            </a:p>
+            <a:p>
+              <a:pPr marL="285750" indent="-285750">
+                <a:buFont typeface="Arial" panose="020B0604020202020204" pitchFamily="34" charset="0"/>
+                <a:buChar char="•"/>
+              </a:pPr>
+              <a:r>
+                <a:rPr lang="en-US" sz="1050" dirty="0" err="1">
+                  <a:solidFill>
+                    <a:schemeClr val="tx1"/>
+                  </a:solidFill>
+                </a:rPr>
+                <a:t>hospital_name</a:t>
+              </a:r>
+              <a:endParaRPr lang="en-US" sz="1050" dirty="0">
+                <a:solidFill>
+                  <a:schemeClr val="tx1"/>
+                </a:solidFill>
+              </a:endParaRPr>
+            </a:p>
+            <a:p>
+              <a:pPr marL="285750" indent="-285750">
+                <a:buFont typeface="Arial" panose="020B0604020202020204" pitchFamily="34" charset="0"/>
+                <a:buChar char="•"/>
+              </a:pPr>
+              <a:r>
+                <a:rPr lang="en-US" sz="1050" dirty="0">
+                  <a:solidFill>
+                    <a:schemeClr val="tx1"/>
+                  </a:solidFill>
+                </a:rPr>
+                <a:t>address</a:t>
+              </a:r>
+            </a:p>
+            <a:p>
+              <a:pPr marL="285750" indent="-285750">
+                <a:buFont typeface="Arial" panose="020B0604020202020204" pitchFamily="34" charset="0"/>
+                <a:buChar char="•"/>
+              </a:pPr>
+              <a:r>
+                <a:rPr lang="en-US" sz="1050" dirty="0">
+                  <a:solidFill>
+                    <a:schemeClr val="tx1"/>
+                  </a:solidFill>
+                </a:rPr>
+                <a:t>city</a:t>
+              </a:r>
+            </a:p>
+            <a:p>
+              <a:pPr marL="285750" indent="-285750">
+                <a:buFont typeface="Arial" panose="020B0604020202020204" pitchFamily="34" charset="0"/>
+                <a:buChar char="•"/>
+              </a:pPr>
+              <a:r>
+                <a:rPr lang="en-US" sz="1050" dirty="0">
+                  <a:solidFill>
+                    <a:schemeClr val="tx1"/>
+                  </a:solidFill>
+                </a:rPr>
+                <a:t>state</a:t>
+              </a:r>
+            </a:p>
+            <a:p>
+              <a:pPr marL="285750" indent="-285750">
+                <a:buFont typeface="Arial" panose="020B0604020202020204" pitchFamily="34" charset="0"/>
+                <a:buChar char="•"/>
+              </a:pPr>
+              <a:r>
+                <a:rPr lang="en-US" sz="1050" dirty="0" err="1">
+                  <a:solidFill>
+                    <a:schemeClr val="tx1"/>
+                  </a:solidFill>
+                </a:rPr>
+                <a:t>zip_code</a:t>
+              </a:r>
+              <a:endParaRPr lang="en-US" sz="1050" dirty="0">
+                <a:solidFill>
+                  <a:schemeClr val="tx1"/>
+                </a:solidFill>
+              </a:endParaRPr>
+            </a:p>
+            <a:p>
+              <a:pPr marL="285750" indent="-285750">
+                <a:buFont typeface="Arial" panose="020B0604020202020204" pitchFamily="34" charset="0"/>
+                <a:buChar char="•"/>
+              </a:pPr>
+              <a:r>
+                <a:rPr lang="en-US" sz="1050" dirty="0" err="1">
+                  <a:solidFill>
+                    <a:schemeClr val="tx1"/>
+                  </a:solidFill>
+                </a:rPr>
+                <a:t>county_name</a:t>
+              </a:r>
+              <a:endParaRPr lang="en-US" sz="1050" dirty="0">
+                <a:solidFill>
+                  <a:schemeClr val="tx1"/>
+                </a:solidFill>
+              </a:endParaRPr>
+            </a:p>
+            <a:p>
+              <a:pPr marL="285750" indent="-285750">
+                <a:buFont typeface="Arial" panose="020B0604020202020204" pitchFamily="34" charset="0"/>
+                <a:buChar char="•"/>
+              </a:pPr>
+              <a:r>
+                <a:rPr lang="en-US" sz="1050" dirty="0" err="1">
+                  <a:solidFill>
+                    <a:schemeClr val="tx1"/>
+                  </a:solidFill>
+                </a:rPr>
+                <a:t>phone_number</a:t>
+              </a:r>
+              <a:endParaRPr lang="en-US" sz="1050" dirty="0">
+                <a:solidFill>
+                  <a:schemeClr val="tx1"/>
+                </a:solidFill>
+              </a:endParaRPr>
+            </a:p>
+            <a:p>
+              <a:pPr marL="285750" indent="-285750">
+                <a:buFont typeface="Arial" panose="020B0604020202020204" pitchFamily="34" charset="0"/>
+                <a:buChar char="•"/>
+              </a:pPr>
+              <a:r>
+                <a:rPr lang="en-US" sz="1050" dirty="0" err="1">
+                  <a:solidFill>
+                    <a:schemeClr val="tx1"/>
+                  </a:solidFill>
+                </a:rPr>
+                <a:t>hospital_type</a:t>
+              </a:r>
+              <a:endParaRPr lang="en-US" sz="1050" dirty="0">
+                <a:solidFill>
+                  <a:schemeClr val="tx1"/>
+                </a:solidFill>
+              </a:endParaRPr>
+            </a:p>
+            <a:p>
+              <a:pPr marL="285750" indent="-285750">
+                <a:buFont typeface="Arial" panose="020B0604020202020204" pitchFamily="34" charset="0"/>
+                <a:buChar char="•"/>
+              </a:pPr>
+              <a:r>
+                <a:rPr lang="en-US" sz="1050" dirty="0" err="1">
+                  <a:solidFill>
+                    <a:schemeClr val="tx1"/>
+                  </a:solidFill>
+                </a:rPr>
+                <a:t>hospital_ownership</a:t>
+              </a:r>
+              <a:endParaRPr lang="en-US" sz="1050" dirty="0">
+                <a:solidFill>
+                  <a:schemeClr val="tx1"/>
+                </a:solidFill>
+              </a:endParaRPr>
+            </a:p>
+            <a:p>
+              <a:pPr marL="285750" indent="-285750">
+                <a:buFont typeface="Arial" panose="020B0604020202020204" pitchFamily="34" charset="0"/>
+                <a:buChar char="•"/>
+              </a:pPr>
+              <a:r>
+                <a:rPr lang="en-US" sz="1050" dirty="0" err="1">
+                  <a:solidFill>
+                    <a:schemeClr val="tx1"/>
+                  </a:solidFill>
+                </a:rPr>
+                <a:t>emergency_services</a:t>
+              </a:r>
+              <a:endParaRPr lang="en-US" sz="1050" dirty="0">
+                <a:solidFill>
+                  <a:schemeClr val="tx1"/>
+                </a:solidFill>
+              </a:endParaRPr>
+            </a:p>
+          </p:txBody>
+        </p:sp>
+        <p:sp>
+          <p:nvSpPr>
+            <p:cNvPr id="22" name="Rectangle 21"/>
+            <p:cNvSpPr/>
+            <p:nvPr/>
+          </p:nvSpPr>
+          <p:spPr>
+            <a:xfrm>
+              <a:off x="4091708" y="1958109"/>
+              <a:ext cx="2105891" cy="387927"/>
+            </a:xfrm>
+            <a:prstGeom prst="rect">
+              <a:avLst/>
+            </a:prstGeom>
+            <a:ln>
+              <a:solidFill>
+                <a:schemeClr val="tx1"/>
+              </a:solidFill>
+            </a:ln>
+          </p:spPr>
+          <p:style>
+            <a:lnRef idx="2">
+              <a:schemeClr val="accent1">
+                <a:shade val="50000"/>
+              </a:schemeClr>
+            </a:lnRef>
+            <a:fillRef idx="1">
+              <a:schemeClr val="accent1"/>
+            </a:fillRef>
+            <a:effectRef idx="0">
+              <a:schemeClr val="accent1"/>
+            </a:effectRef>
+            <a:fontRef idx="minor">
+              <a:schemeClr val="lt1"/>
+            </a:fontRef>
+          </p:style>
+          <p:txBody>
+            <a:bodyPr rtlCol="0" anchor="ctr"/>
+            <a:lstStyle/>
+            <a:p>
+              <a:pPr algn="ctr"/>
+              <a:r>
+                <a:rPr lang="en-US" sz="1050" dirty="0"/>
+                <a:t>hospitals</a:t>
+              </a:r>
+            </a:p>
+          </p:txBody>
+        </p:sp>
+      </p:grpSp>
     </p:spTree>
     <p:extLst>
       <p:ext uri="{BB962C8B-B14F-4D97-AF65-F5344CB8AC3E}">

</xml_diff>

<commit_message>
added hospital_compare and procedure variability
</commit_message>
<xml_diff>
--- a/documents/ERF.pptx
+++ b/documents/ERF.pptx
@@ -246,7 +246,7 @@
           <a:p>
             <a:fld id="{9CF71C48-D304-4A48-BAC6-9C5BC7076525}" type="datetimeFigureOut">
               <a:rPr lang="en-US" smtClean="0"/>
-              <a:t>10/28/2017</a:t>
+              <a:t>10/30/2017</a:t>
             </a:fld>
             <a:endParaRPr lang="en-US"/>
           </a:p>
@@ -414,7 +414,7 @@
           <a:p>
             <a:fld id="{9CF71C48-D304-4A48-BAC6-9C5BC7076525}" type="datetimeFigureOut">
               <a:rPr lang="en-US" smtClean="0"/>
-              <a:t>10/28/2017</a:t>
+              <a:t>10/30/2017</a:t>
             </a:fld>
             <a:endParaRPr lang="en-US"/>
           </a:p>
@@ -592,7 +592,7 @@
           <a:p>
             <a:fld id="{9CF71C48-D304-4A48-BAC6-9C5BC7076525}" type="datetimeFigureOut">
               <a:rPr lang="en-US" smtClean="0"/>
-              <a:t>10/28/2017</a:t>
+              <a:t>10/30/2017</a:t>
             </a:fld>
             <a:endParaRPr lang="en-US"/>
           </a:p>
@@ -760,7 +760,7 @@
           <a:p>
             <a:fld id="{9CF71C48-D304-4A48-BAC6-9C5BC7076525}" type="datetimeFigureOut">
               <a:rPr lang="en-US" smtClean="0"/>
-              <a:t>10/28/2017</a:t>
+              <a:t>10/30/2017</a:t>
             </a:fld>
             <a:endParaRPr lang="en-US"/>
           </a:p>
@@ -1005,7 +1005,7 @@
           <a:p>
             <a:fld id="{9CF71C48-D304-4A48-BAC6-9C5BC7076525}" type="datetimeFigureOut">
               <a:rPr lang="en-US" smtClean="0"/>
-              <a:t>10/28/2017</a:t>
+              <a:t>10/30/2017</a:t>
             </a:fld>
             <a:endParaRPr lang="en-US"/>
           </a:p>
@@ -1234,7 +1234,7 @@
           <a:p>
             <a:fld id="{9CF71C48-D304-4A48-BAC6-9C5BC7076525}" type="datetimeFigureOut">
               <a:rPr lang="en-US" smtClean="0"/>
-              <a:t>10/28/2017</a:t>
+              <a:t>10/30/2017</a:t>
             </a:fld>
             <a:endParaRPr lang="en-US"/>
           </a:p>
@@ -1598,7 +1598,7 @@
           <a:p>
             <a:fld id="{9CF71C48-D304-4A48-BAC6-9C5BC7076525}" type="datetimeFigureOut">
               <a:rPr lang="en-US" smtClean="0"/>
-              <a:t>10/28/2017</a:t>
+              <a:t>10/30/2017</a:t>
             </a:fld>
             <a:endParaRPr lang="en-US"/>
           </a:p>
@@ -1715,7 +1715,7 @@
           <a:p>
             <a:fld id="{9CF71C48-D304-4A48-BAC6-9C5BC7076525}" type="datetimeFigureOut">
               <a:rPr lang="en-US" smtClean="0"/>
-              <a:t>10/28/2017</a:t>
+              <a:t>10/30/2017</a:t>
             </a:fld>
             <a:endParaRPr lang="en-US"/>
           </a:p>
@@ -1810,7 +1810,7 @@
           <a:p>
             <a:fld id="{9CF71C48-D304-4A48-BAC6-9C5BC7076525}" type="datetimeFigureOut">
               <a:rPr lang="en-US" smtClean="0"/>
-              <a:t>10/28/2017</a:t>
+              <a:t>10/30/2017</a:t>
             </a:fld>
             <a:endParaRPr lang="en-US"/>
           </a:p>
@@ -2085,7 +2085,7 @@
           <a:p>
             <a:fld id="{9CF71C48-D304-4A48-BAC6-9C5BC7076525}" type="datetimeFigureOut">
               <a:rPr lang="en-US" smtClean="0"/>
-              <a:t>10/28/2017</a:t>
+              <a:t>10/30/2017</a:t>
             </a:fld>
             <a:endParaRPr lang="en-US"/>
           </a:p>
@@ -2337,7 +2337,7 @@
           <a:p>
             <a:fld id="{9CF71C48-D304-4A48-BAC6-9C5BC7076525}" type="datetimeFigureOut">
               <a:rPr lang="en-US" smtClean="0"/>
-              <a:t>10/28/2017</a:t>
+              <a:t>10/30/2017</a:t>
             </a:fld>
             <a:endParaRPr lang="en-US"/>
           </a:p>
@@ -2548,7 +2548,7 @@
           <a:p>
             <a:fld id="{9CF71C48-D304-4A48-BAC6-9C5BC7076525}" type="datetimeFigureOut">
               <a:rPr lang="en-US" smtClean="0"/>
-              <a:t>10/28/2017</a:t>
+              <a:t>10/30/2017</a:t>
             </a:fld>
             <a:endParaRPr lang="en-US"/>
           </a:p>
@@ -6208,10 +6208,10 @@
         </p:nvGrpSpPr>
         <p:grpSpPr>
           <a:xfrm>
-            <a:off x="4634339" y="4596519"/>
-            <a:ext cx="1905006" cy="1517695"/>
+            <a:off x="7257464" y="491854"/>
+            <a:ext cx="2246752" cy="1804281"/>
             <a:chOff x="4091708" y="1958109"/>
-            <a:chExt cx="2105892" cy="1739952"/>
+            <a:chExt cx="2105892" cy="2068507"/>
           </a:xfrm>
         </p:grpSpPr>
         <p:sp>
@@ -6223,7 +6223,7 @@
           <p:spPr>
             <a:xfrm>
               <a:off x="4091710" y="2346036"/>
-              <a:ext cx="2105890" cy="1352025"/>
+              <a:ext cx="2105890" cy="1680580"/>
             </a:xfrm>
             <a:prstGeom prst="rect">
               <a:avLst/>
@@ -6267,105 +6267,140 @@
                     <a:schemeClr val="tx1"/>
                   </a:solidFill>
                 </a:rPr>
-                <a:t>measure_name</a:t>
-              </a:r>
-              <a:endParaRPr lang="en-US" sz="1050" dirty="0">
-                <a:solidFill>
-                  <a:schemeClr val="tx1"/>
-                </a:solidFill>
-              </a:endParaRPr>
-            </a:p>
-            <a:p>
-              <a:pPr marL="285750" indent="-285750">
-                <a:buFont typeface="Arial" panose="020B0604020202020204" pitchFamily="34" charset="0"/>
-                <a:buChar char="•"/>
-              </a:pPr>
-              <a:r>
-                <a:rPr lang="en-US" sz="1050" dirty="0" err="1">
-                  <a:solidFill>
-                    <a:schemeClr val="tx1"/>
-                  </a:solidFill>
-                </a:rPr>
-                <a:t>measure_id</a:t>
-              </a:r>
-              <a:endParaRPr lang="en-US" sz="1050" dirty="0">
-                <a:solidFill>
-                  <a:schemeClr val="tx1"/>
-                </a:solidFill>
-              </a:endParaRPr>
-            </a:p>
-            <a:p>
-              <a:pPr marL="285750" indent="-285750">
-                <a:buFont typeface="Arial" panose="020B0604020202020204" pitchFamily="34" charset="0"/>
-                <a:buChar char="•"/>
-              </a:pPr>
-              <a:r>
-                <a:rPr lang="en-US" sz="1050" dirty="0" err="1">
-                  <a:solidFill>
-                    <a:schemeClr val="tx1"/>
-                  </a:solidFill>
-                </a:rPr>
-                <a:t>measure_start_quarter</a:t>
-              </a:r>
-              <a:r>
-                <a:rPr lang="en-US" sz="1050" dirty="0">
-                  <a:solidFill>
-                    <a:schemeClr val="tx1"/>
-                  </a:solidFill>
-                </a:rPr>
-                <a:t> </a:t>
-              </a:r>
-            </a:p>
-            <a:p>
-              <a:pPr marL="285750" indent="-285750">
-                <a:buFont typeface="Arial" panose="020B0604020202020204" pitchFamily="34" charset="0"/>
-                <a:buChar char="•"/>
-              </a:pPr>
-              <a:r>
-                <a:rPr lang="en-US" sz="1050" dirty="0" err="1">
-                  <a:solidFill>
-                    <a:schemeClr val="tx1"/>
-                  </a:solidFill>
-                </a:rPr>
-                <a:t>measure_start_date</a:t>
-              </a:r>
-              <a:r>
-                <a:rPr lang="en-US" sz="1050" dirty="0">
-                  <a:solidFill>
-                    <a:schemeClr val="tx1"/>
-                  </a:solidFill>
-                </a:rPr>
-                <a:t> </a:t>
-              </a:r>
-            </a:p>
-            <a:p>
-              <a:pPr marL="285750" indent="-285750">
-                <a:buFont typeface="Arial" panose="020B0604020202020204" pitchFamily="34" charset="0"/>
-                <a:buChar char="•"/>
-              </a:pPr>
-              <a:r>
-                <a:rPr lang="en-US" sz="1050" dirty="0" err="1">
-                  <a:solidFill>
-                    <a:schemeClr val="tx1"/>
-                  </a:solidFill>
-                </a:rPr>
-                <a:t>measure_end_quarter</a:t>
-              </a:r>
-              <a:r>
-                <a:rPr lang="en-US" sz="1050" dirty="0">
-                  <a:solidFill>
-                    <a:schemeClr val="tx1"/>
-                  </a:solidFill>
-                </a:rPr>
-                <a:t> </a:t>
-              </a:r>
-              <a:r>
-                <a:rPr lang="en-US" sz="1050" dirty="0" err="1">
-                  <a:solidFill>
-                    <a:schemeClr val="tx1"/>
-                  </a:solidFill>
-                </a:rPr>
-                <a:t>measure_end_date</a:t>
+                <a:t>provider_id</a:t>
+              </a:r>
+              <a:endParaRPr lang="en-US" sz="1050" dirty="0">
+                <a:solidFill>
+                  <a:schemeClr val="tx1"/>
+                </a:solidFill>
+              </a:endParaRPr>
+            </a:p>
+            <a:p>
+              <a:pPr marL="285750" indent="-285750">
+                <a:buFont typeface="Arial" panose="020B0604020202020204" pitchFamily="34" charset="0"/>
+                <a:buChar char="•"/>
+              </a:pPr>
+              <a:r>
+                <a:rPr lang="en-US" sz="1050" dirty="0" err="1">
+                  <a:solidFill>
+                    <a:schemeClr val="tx1"/>
+                  </a:solidFill>
+                </a:rPr>
+                <a:t>mortality_score</a:t>
+              </a:r>
+              <a:endParaRPr lang="en-US" sz="1050" dirty="0">
+                <a:solidFill>
+                  <a:schemeClr val="tx1"/>
+                </a:solidFill>
+              </a:endParaRPr>
+            </a:p>
+            <a:p>
+              <a:pPr marL="285750" indent="-285750">
+                <a:buFont typeface="Arial" panose="020B0604020202020204" pitchFamily="34" charset="0"/>
+                <a:buChar char="•"/>
+              </a:pPr>
+              <a:r>
+                <a:rPr lang="en-US" sz="1050" dirty="0" err="1">
+                  <a:solidFill>
+                    <a:schemeClr val="tx1"/>
+                  </a:solidFill>
+                </a:rPr>
+                <a:t>safety_score</a:t>
+              </a:r>
+              <a:endParaRPr lang="en-US" sz="1050" dirty="0">
+                <a:solidFill>
+                  <a:schemeClr val="tx1"/>
+                </a:solidFill>
+              </a:endParaRPr>
+            </a:p>
+            <a:p>
+              <a:pPr marL="285750" indent="-285750">
+                <a:buFont typeface="Arial" panose="020B0604020202020204" pitchFamily="34" charset="0"/>
+                <a:buChar char="•"/>
+              </a:pPr>
+              <a:r>
+                <a:rPr lang="en-US" sz="1050" dirty="0" err="1">
+                  <a:solidFill>
+                    <a:schemeClr val="tx1"/>
+                  </a:solidFill>
+                </a:rPr>
+                <a:t>readmission_score</a:t>
+              </a:r>
+              <a:endParaRPr lang="en-US" sz="1050" dirty="0">
+                <a:solidFill>
+                  <a:schemeClr val="tx1"/>
+                </a:solidFill>
+              </a:endParaRPr>
+            </a:p>
+            <a:p>
+              <a:pPr marL="285750" indent="-285750">
+                <a:buFont typeface="Arial" panose="020B0604020202020204" pitchFamily="34" charset="0"/>
+                <a:buChar char="•"/>
+              </a:pPr>
+              <a:r>
+                <a:rPr lang="en-US" sz="1050" dirty="0" err="1">
+                  <a:solidFill>
+                    <a:schemeClr val="tx1"/>
+                  </a:solidFill>
+                </a:rPr>
+                <a:t>patient_experience_score</a:t>
+              </a:r>
+              <a:endParaRPr lang="en-US" sz="1050" dirty="0">
+                <a:solidFill>
+                  <a:schemeClr val="tx1"/>
+                </a:solidFill>
+              </a:endParaRPr>
+            </a:p>
+            <a:p>
+              <a:pPr marL="285750" indent="-285750">
+                <a:buFont typeface="Arial" panose="020B0604020202020204" pitchFamily="34" charset="0"/>
+                <a:buChar char="•"/>
+              </a:pPr>
+              <a:r>
+                <a:rPr lang="en-US" sz="1050" dirty="0" err="1">
+                  <a:solidFill>
+                    <a:schemeClr val="tx1"/>
+                  </a:solidFill>
+                </a:rPr>
+                <a:t>effectiveness_score</a:t>
+              </a:r>
+              <a:endParaRPr lang="en-US" sz="1050" dirty="0">
+                <a:solidFill>
+                  <a:schemeClr val="tx1"/>
+                </a:solidFill>
+              </a:endParaRPr>
+            </a:p>
+            <a:p>
+              <a:pPr marL="285750" indent="-285750">
+                <a:buFont typeface="Arial" panose="020B0604020202020204" pitchFamily="34" charset="0"/>
+                <a:buChar char="•"/>
+              </a:pPr>
+              <a:r>
+                <a:rPr lang="en-US" sz="1050" dirty="0" err="1">
+                  <a:solidFill>
+                    <a:schemeClr val="tx1"/>
+                  </a:solidFill>
+                </a:rPr>
+                <a:t>timeliness_score</a:t>
+              </a:r>
+              <a:endParaRPr lang="en-US" sz="1050" dirty="0">
+                <a:solidFill>
+                  <a:schemeClr val="tx1"/>
+                </a:solidFill>
+              </a:endParaRPr>
+            </a:p>
+            <a:p>
+              <a:pPr marL="285750" indent="-285750">
+                <a:buFont typeface="Arial" panose="020B0604020202020204" pitchFamily="34" charset="0"/>
+                <a:buChar char="•"/>
+              </a:pPr>
+              <a:r>
+                <a:rPr lang="en-US" sz="1050" dirty="0" err="1">
+                  <a:solidFill>
+                    <a:schemeClr val="tx1"/>
+                  </a:solidFill>
+                </a:rPr>
+                <a:t>efficiency_score</a:t>
               </a:r>
               <a:endParaRPr lang="en-US" sz="1050" dirty="0">
                 <a:solidFill>
@@ -6417,9 +6452,531 @@
             <a:p>
               <a:pPr algn="ctr"/>
               <a:r>
-                <a:rPr lang="en-US" sz="1050" dirty="0"/>
-                <a:t>measures</a:t>
-              </a:r>
+                <a:rPr lang="en-US" sz="1050" dirty="0" err="1"/>
+                <a:t>hospital_baseline</a:t>
+              </a:r>
+              <a:endParaRPr lang="en-US" sz="1050" dirty="0"/>
+            </a:p>
+          </p:txBody>
+        </p:sp>
+      </p:grpSp>
+      <p:grpSp>
+        <p:nvGrpSpPr>
+          <p:cNvPr id="5" name="Group 4"/>
+          <p:cNvGrpSpPr/>
+          <p:nvPr/>
+        </p:nvGrpSpPr>
+        <p:grpSpPr>
+          <a:xfrm>
+            <a:off x="4015503" y="1539061"/>
+            <a:ext cx="1868062" cy="1613949"/>
+            <a:chOff x="4091708" y="1958109"/>
+            <a:chExt cx="2105892" cy="1850301"/>
+          </a:xfrm>
+        </p:grpSpPr>
+        <p:sp>
+          <p:nvSpPr>
+            <p:cNvPr id="6" name="Rectangle 5"/>
+            <p:cNvSpPr/>
+            <p:nvPr/>
+          </p:nvSpPr>
+          <p:spPr>
+            <a:xfrm>
+              <a:off x="4091710" y="2346037"/>
+              <a:ext cx="2105890" cy="1462373"/>
+            </a:xfrm>
+            <a:prstGeom prst="rect">
+              <a:avLst/>
+            </a:prstGeom>
+            <a:solidFill>
+              <a:schemeClr val="bg1"/>
+            </a:solidFill>
+            <a:ln>
+              <a:solidFill>
+                <a:schemeClr val="tx1"/>
+              </a:solidFill>
+            </a:ln>
+          </p:spPr>
+          <p:style>
+            <a:lnRef idx="2">
+              <a:schemeClr val="accent1">
+                <a:shade val="50000"/>
+              </a:schemeClr>
+            </a:lnRef>
+            <a:fillRef idx="1">
+              <a:schemeClr val="accent1"/>
+            </a:fillRef>
+            <a:effectRef idx="0">
+              <a:schemeClr val="accent1"/>
+            </a:effectRef>
+            <a:fontRef idx="minor">
+              <a:schemeClr val="lt1"/>
+            </a:fontRef>
+          </p:style>
+          <p:txBody>
+            <a:bodyPr rtlCol="0" anchor="t"/>
+            <a:lstStyle/>
+            <a:p>
+              <a:pPr marL="285750" indent="-285750">
+                <a:buFont typeface="Arial" panose="020B0604020202020204" pitchFamily="34" charset="0"/>
+                <a:buChar char="•"/>
+              </a:pPr>
+              <a:r>
+                <a:rPr lang="en-US" sz="1050" dirty="0" err="1">
+                  <a:solidFill>
+                    <a:schemeClr val="tx1"/>
+                  </a:solidFill>
+                </a:rPr>
+                <a:t>provider_id</a:t>
+              </a:r>
+              <a:endParaRPr lang="en-US" sz="1050" dirty="0">
+                <a:solidFill>
+                  <a:schemeClr val="tx1"/>
+                </a:solidFill>
+              </a:endParaRPr>
+            </a:p>
+            <a:p>
+              <a:pPr marL="285750" indent="-285750">
+                <a:buFont typeface="Arial" panose="020B0604020202020204" pitchFamily="34" charset="0"/>
+                <a:buChar char="•"/>
+              </a:pPr>
+              <a:r>
+                <a:rPr lang="en-US" sz="1050" dirty="0" err="1">
+                  <a:solidFill>
+                    <a:schemeClr val="tx1"/>
+                  </a:solidFill>
+                </a:rPr>
+                <a:t>hospital_name</a:t>
+              </a:r>
+              <a:endParaRPr lang="en-US" sz="1050" dirty="0">
+                <a:solidFill>
+                  <a:schemeClr val="tx1"/>
+                </a:solidFill>
+              </a:endParaRPr>
+            </a:p>
+            <a:p>
+              <a:pPr marL="285750" indent="-285750">
+                <a:buFont typeface="Arial" panose="020B0604020202020204" pitchFamily="34" charset="0"/>
+                <a:buChar char="•"/>
+              </a:pPr>
+              <a:r>
+                <a:rPr lang="en-US" sz="1050" dirty="0">
+                  <a:solidFill>
+                    <a:schemeClr val="tx1"/>
+                  </a:solidFill>
+                </a:rPr>
+                <a:t>city</a:t>
+              </a:r>
+            </a:p>
+            <a:p>
+              <a:pPr marL="285750" indent="-285750">
+                <a:buFont typeface="Arial" panose="020B0604020202020204" pitchFamily="34" charset="0"/>
+                <a:buChar char="•"/>
+              </a:pPr>
+              <a:r>
+                <a:rPr lang="en-US" sz="1050" dirty="0">
+                  <a:solidFill>
+                    <a:schemeClr val="tx1"/>
+                  </a:solidFill>
+                </a:rPr>
+                <a:t>state</a:t>
+              </a:r>
+            </a:p>
+            <a:p>
+              <a:pPr marL="285750" indent="-285750">
+                <a:buFont typeface="Arial" panose="020B0604020202020204" pitchFamily="34" charset="0"/>
+                <a:buChar char="•"/>
+              </a:pPr>
+              <a:r>
+                <a:rPr lang="en-US" sz="1050" dirty="0" err="1">
+                  <a:solidFill>
+                    <a:schemeClr val="tx1"/>
+                  </a:solidFill>
+                </a:rPr>
+                <a:t>zip_code</a:t>
+              </a:r>
+              <a:endParaRPr lang="en-US" sz="1050" dirty="0">
+                <a:solidFill>
+                  <a:schemeClr val="tx1"/>
+                </a:solidFill>
+              </a:endParaRPr>
+            </a:p>
+            <a:p>
+              <a:pPr marL="285750" indent="-285750">
+                <a:buFont typeface="Arial" panose="020B0604020202020204" pitchFamily="34" charset="0"/>
+                <a:buChar char="•"/>
+              </a:pPr>
+              <a:r>
+                <a:rPr lang="en-US" sz="1050" dirty="0" err="1">
+                  <a:solidFill>
+                    <a:schemeClr val="tx1"/>
+                  </a:solidFill>
+                </a:rPr>
+                <a:t>hospital_type</a:t>
+              </a:r>
+              <a:endParaRPr lang="en-US" sz="1050" dirty="0">
+                <a:solidFill>
+                  <a:schemeClr val="tx1"/>
+                </a:solidFill>
+              </a:endParaRPr>
+            </a:p>
+            <a:p>
+              <a:pPr marL="285750" indent="-285750">
+                <a:buFont typeface="Arial" panose="020B0604020202020204" pitchFamily="34" charset="0"/>
+                <a:buChar char="•"/>
+              </a:pPr>
+              <a:r>
+                <a:rPr lang="en-US" sz="1050" dirty="0" err="1">
+                  <a:solidFill>
+                    <a:schemeClr val="tx1"/>
+                  </a:solidFill>
+                </a:rPr>
+                <a:t>hospital_ownership</a:t>
+              </a:r>
+              <a:endParaRPr lang="en-US" sz="1050" dirty="0">
+                <a:solidFill>
+                  <a:schemeClr val="tx1"/>
+                </a:solidFill>
+              </a:endParaRPr>
+            </a:p>
+            <a:p>
+              <a:pPr marL="285750" indent="-285750">
+                <a:buFont typeface="Arial" panose="020B0604020202020204" pitchFamily="34" charset="0"/>
+                <a:buChar char="•"/>
+              </a:pPr>
+              <a:endParaRPr lang="en-US" sz="1050" dirty="0">
+                <a:solidFill>
+                  <a:schemeClr val="tx1"/>
+                </a:solidFill>
+              </a:endParaRPr>
+            </a:p>
+          </p:txBody>
+        </p:sp>
+        <p:sp>
+          <p:nvSpPr>
+            <p:cNvPr id="7" name="Rectangle 6"/>
+            <p:cNvSpPr/>
+            <p:nvPr/>
+          </p:nvSpPr>
+          <p:spPr>
+            <a:xfrm>
+              <a:off x="4091708" y="1958109"/>
+              <a:ext cx="2105891" cy="387927"/>
+            </a:xfrm>
+            <a:prstGeom prst="rect">
+              <a:avLst/>
+            </a:prstGeom>
+            <a:ln>
+              <a:solidFill>
+                <a:schemeClr val="tx1"/>
+              </a:solidFill>
+            </a:ln>
+          </p:spPr>
+          <p:style>
+            <a:lnRef idx="2">
+              <a:schemeClr val="accent1">
+                <a:shade val="50000"/>
+              </a:schemeClr>
+            </a:lnRef>
+            <a:fillRef idx="1">
+              <a:schemeClr val="accent1"/>
+            </a:fillRef>
+            <a:effectRef idx="0">
+              <a:schemeClr val="accent1"/>
+            </a:effectRef>
+            <a:fontRef idx="minor">
+              <a:schemeClr val="lt1"/>
+            </a:fontRef>
+          </p:style>
+          <p:txBody>
+            <a:bodyPr rtlCol="0" anchor="ctr"/>
+            <a:lstStyle/>
+            <a:p>
+              <a:pPr algn="ctr"/>
+              <a:r>
+                <a:rPr lang="en-US" sz="1050" dirty="0" err="1"/>
+                <a:t>hospital_info</a:t>
+              </a:r>
+              <a:endParaRPr lang="en-US" sz="1050" dirty="0"/>
+            </a:p>
+          </p:txBody>
+        </p:sp>
+      </p:grpSp>
+      <p:grpSp>
+        <p:nvGrpSpPr>
+          <p:cNvPr id="13" name="Group 12"/>
+          <p:cNvGrpSpPr/>
+          <p:nvPr/>
+        </p:nvGrpSpPr>
+        <p:grpSpPr>
+          <a:xfrm>
+            <a:off x="7257464" y="2859901"/>
+            <a:ext cx="3622971" cy="1952244"/>
+            <a:chOff x="4091708" y="1958109"/>
+            <a:chExt cx="2105892" cy="2238137"/>
+          </a:xfrm>
+        </p:grpSpPr>
+        <p:sp>
+          <p:nvSpPr>
+            <p:cNvPr id="14" name="Rectangle 13"/>
+            <p:cNvSpPr/>
+            <p:nvPr/>
+          </p:nvSpPr>
+          <p:spPr>
+            <a:xfrm>
+              <a:off x="4091710" y="2346037"/>
+              <a:ext cx="2105890" cy="1850209"/>
+            </a:xfrm>
+            <a:prstGeom prst="rect">
+              <a:avLst/>
+            </a:prstGeom>
+            <a:solidFill>
+              <a:schemeClr val="bg1"/>
+            </a:solidFill>
+            <a:ln>
+              <a:solidFill>
+                <a:schemeClr val="tx1"/>
+              </a:solidFill>
+            </a:ln>
+          </p:spPr>
+          <p:style>
+            <a:lnRef idx="2">
+              <a:schemeClr val="accent1">
+                <a:shade val="50000"/>
+              </a:schemeClr>
+            </a:lnRef>
+            <a:fillRef idx="1">
+              <a:schemeClr val="accent1"/>
+            </a:fillRef>
+            <a:effectRef idx="0">
+              <a:schemeClr val="accent1"/>
+            </a:effectRef>
+            <a:fontRef idx="minor">
+              <a:schemeClr val="lt1"/>
+            </a:fontRef>
+          </p:style>
+          <p:txBody>
+            <a:bodyPr rtlCol="0" anchor="t"/>
+            <a:lstStyle/>
+            <a:p>
+              <a:pPr marL="285750" indent="-285750">
+                <a:buFont typeface="Arial" panose="020B0604020202020204" pitchFamily="34" charset="0"/>
+                <a:buChar char="•"/>
+              </a:pPr>
+              <a:r>
+                <a:rPr lang="en-US" sz="1050" dirty="0" err="1">
+                  <a:solidFill>
+                    <a:schemeClr val="tx1"/>
+                  </a:solidFill>
+                </a:rPr>
+                <a:t>provider_id</a:t>
+              </a:r>
+              <a:endParaRPr lang="en-US" sz="1050" dirty="0">
+                <a:solidFill>
+                  <a:schemeClr val="tx1"/>
+                </a:solidFill>
+              </a:endParaRPr>
+            </a:p>
+            <a:p>
+              <a:pPr marL="285750" indent="-285750">
+                <a:buFont typeface="Arial" panose="020B0604020202020204" pitchFamily="34" charset="0"/>
+                <a:buChar char="•"/>
+              </a:pPr>
+              <a:r>
+                <a:rPr lang="en-US" sz="1050" dirty="0" err="1">
+                  <a:solidFill>
+                    <a:schemeClr val="tx1"/>
+                  </a:solidFill>
+                </a:rPr>
+                <a:t>hospital_overall_rating</a:t>
+              </a:r>
+              <a:endParaRPr lang="en-US" sz="1050" dirty="0">
+                <a:solidFill>
+                  <a:schemeClr val="tx1"/>
+                </a:solidFill>
+              </a:endParaRPr>
+            </a:p>
+            <a:p>
+              <a:pPr marL="285750" indent="-285750">
+                <a:buFont typeface="Arial" panose="020B0604020202020204" pitchFamily="34" charset="0"/>
+                <a:buChar char="•"/>
+              </a:pPr>
+              <a:r>
+                <a:rPr lang="en-US" sz="1050" dirty="0" err="1">
+                  <a:solidFill>
+                    <a:schemeClr val="tx1"/>
+                  </a:solidFill>
+                </a:rPr>
+                <a:t>mortality_national_comparison</a:t>
+              </a:r>
+              <a:endParaRPr lang="en-US" sz="1050" dirty="0">
+                <a:solidFill>
+                  <a:schemeClr val="tx1"/>
+                </a:solidFill>
+              </a:endParaRPr>
+            </a:p>
+            <a:p>
+              <a:pPr marL="285750" indent="-285750">
+                <a:buFont typeface="Arial" panose="020B0604020202020204" pitchFamily="34" charset="0"/>
+                <a:buChar char="•"/>
+              </a:pPr>
+              <a:r>
+                <a:rPr lang="en-US" sz="1050" dirty="0" err="1">
+                  <a:solidFill>
+                    <a:schemeClr val="tx1"/>
+                  </a:solidFill>
+                </a:rPr>
+                <a:t>safety_of_care_national_comparison</a:t>
+              </a:r>
+              <a:endParaRPr lang="en-US" sz="1050" dirty="0">
+                <a:solidFill>
+                  <a:schemeClr val="tx1"/>
+                </a:solidFill>
+              </a:endParaRPr>
+            </a:p>
+            <a:p>
+              <a:pPr marL="285750" indent="-285750">
+                <a:buFont typeface="Arial" panose="020B0604020202020204" pitchFamily="34" charset="0"/>
+                <a:buChar char="•"/>
+              </a:pPr>
+              <a:r>
+                <a:rPr lang="en-US" sz="1050" dirty="0" err="1">
+                  <a:solidFill>
+                    <a:schemeClr val="tx1"/>
+                  </a:solidFill>
+                </a:rPr>
+                <a:t>readmission_national_comparison</a:t>
+              </a:r>
+              <a:endParaRPr lang="en-US" sz="1050" dirty="0">
+                <a:solidFill>
+                  <a:schemeClr val="tx1"/>
+                </a:solidFill>
+              </a:endParaRPr>
+            </a:p>
+            <a:p>
+              <a:pPr marL="285750" indent="-285750">
+                <a:buFont typeface="Arial" panose="020B0604020202020204" pitchFamily="34" charset="0"/>
+                <a:buChar char="•"/>
+              </a:pPr>
+              <a:r>
+                <a:rPr lang="en-US" sz="1050" dirty="0" err="1">
+                  <a:solidFill>
+                    <a:schemeClr val="tx1"/>
+                  </a:solidFill>
+                </a:rPr>
+                <a:t>patient_experience_national_comparison</a:t>
+              </a:r>
+              <a:endParaRPr lang="en-US" sz="1050" dirty="0">
+                <a:solidFill>
+                  <a:schemeClr val="tx1"/>
+                </a:solidFill>
+              </a:endParaRPr>
+            </a:p>
+            <a:p>
+              <a:pPr marL="285750" indent="-285750">
+                <a:buFont typeface="Arial" panose="020B0604020202020204" pitchFamily="34" charset="0"/>
+                <a:buChar char="•"/>
+              </a:pPr>
+              <a:r>
+                <a:rPr lang="en-US" sz="1050" dirty="0" err="1">
+                  <a:solidFill>
+                    <a:schemeClr val="tx1"/>
+                  </a:solidFill>
+                </a:rPr>
+                <a:t>effectiveness_of_care_national_comparison</a:t>
+              </a:r>
+              <a:endParaRPr lang="en-US" sz="1050" dirty="0">
+                <a:solidFill>
+                  <a:schemeClr val="tx1"/>
+                </a:solidFill>
+              </a:endParaRPr>
+            </a:p>
+            <a:p>
+              <a:pPr marL="285750" indent="-285750">
+                <a:buFont typeface="Arial" panose="020B0604020202020204" pitchFamily="34" charset="0"/>
+                <a:buChar char="•"/>
+              </a:pPr>
+              <a:r>
+                <a:rPr lang="en-US" sz="1050" dirty="0" err="1">
+                  <a:solidFill>
+                    <a:schemeClr val="tx1"/>
+                  </a:solidFill>
+                </a:rPr>
+                <a:t>timeliness_of_care_national_comparison</a:t>
+              </a:r>
+              <a:endParaRPr lang="en-US" sz="1050" dirty="0">
+                <a:solidFill>
+                  <a:schemeClr val="tx1"/>
+                </a:solidFill>
+              </a:endParaRPr>
+            </a:p>
+            <a:p>
+              <a:pPr marL="285750" indent="-285750">
+                <a:buFont typeface="Arial" panose="020B0604020202020204" pitchFamily="34" charset="0"/>
+                <a:buChar char="•"/>
+              </a:pPr>
+              <a:r>
+                <a:rPr lang="en-US" sz="1050" dirty="0" err="1">
+                  <a:solidFill>
+                    <a:schemeClr val="tx1"/>
+                  </a:solidFill>
+                </a:rPr>
+                <a:t>efficient_use_of_medical_imaging_national_comparison</a:t>
+              </a:r>
+              <a:endParaRPr lang="en-US" sz="1050" dirty="0">
+                <a:solidFill>
+                  <a:schemeClr val="tx1"/>
+                </a:solidFill>
+              </a:endParaRPr>
+            </a:p>
+          </p:txBody>
+        </p:sp>
+        <p:sp>
+          <p:nvSpPr>
+            <p:cNvPr id="15" name="Rectangle 14"/>
+            <p:cNvSpPr/>
+            <p:nvPr/>
+          </p:nvSpPr>
+          <p:spPr>
+            <a:xfrm>
+              <a:off x="4091708" y="1958109"/>
+              <a:ext cx="2105891" cy="387927"/>
+            </a:xfrm>
+            <a:prstGeom prst="rect">
+              <a:avLst/>
+            </a:prstGeom>
+            <a:ln>
+              <a:solidFill>
+                <a:schemeClr val="tx1"/>
+              </a:solidFill>
+            </a:ln>
+          </p:spPr>
+          <p:style>
+            <a:lnRef idx="2">
+              <a:schemeClr val="accent1">
+                <a:shade val="50000"/>
+              </a:schemeClr>
+            </a:lnRef>
+            <a:fillRef idx="1">
+              <a:schemeClr val="accent1"/>
+            </a:fillRef>
+            <a:effectRef idx="0">
+              <a:schemeClr val="accent1"/>
+            </a:effectRef>
+            <a:fontRef idx="minor">
+              <a:schemeClr val="lt1"/>
+            </a:fontRef>
+          </p:style>
+          <p:txBody>
+            <a:bodyPr rtlCol="0" anchor="ctr"/>
+            <a:lstStyle/>
+            <a:p>
+              <a:pPr algn="ctr"/>
+              <a:r>
+                <a:rPr lang="en-US" sz="1050" dirty="0" err="1"/>
+                <a:t>hospital_comparison</a:t>
+              </a:r>
+              <a:endParaRPr lang="en-US" sz="1050" dirty="0"/>
             </a:p>
           </p:txBody>
         </p:sp>

</xml_diff>

<commit_message>
adding more queries for q2 and q3
</commit_message>
<xml_diff>
--- a/documents/ERF.pptx
+++ b/documents/ERF.pptx
@@ -6208,10 +6208,10 @@
         </p:nvGrpSpPr>
         <p:grpSpPr>
           <a:xfrm>
-            <a:off x="7257464" y="491854"/>
-            <a:ext cx="2246752" cy="1804281"/>
+            <a:off x="645374" y="408727"/>
+            <a:ext cx="2246752" cy="755055"/>
             <a:chOff x="4091708" y="1958109"/>
-            <a:chExt cx="2105892" cy="2068507"/>
+            <a:chExt cx="2105892" cy="865628"/>
           </a:xfrm>
         </p:grpSpPr>
         <p:sp>
@@ -6223,7 +6223,7 @@
           <p:spPr>
             <a:xfrm>
               <a:off x="4091710" y="2346036"/>
-              <a:ext cx="2105890" cy="1680580"/>
+              <a:ext cx="2105890" cy="477701"/>
             </a:xfrm>
             <a:prstGeom prst="rect">
               <a:avLst/>
@@ -6286,121 +6286,7 @@
                     <a:schemeClr val="tx1"/>
                   </a:solidFill>
                 </a:rPr>
-                <a:t>mortality_score</a:t>
-              </a:r>
-              <a:endParaRPr lang="en-US" sz="1050" dirty="0">
-                <a:solidFill>
-                  <a:schemeClr val="tx1"/>
-                </a:solidFill>
-              </a:endParaRPr>
-            </a:p>
-            <a:p>
-              <a:pPr marL="285750" indent="-285750">
-                <a:buFont typeface="Arial" panose="020B0604020202020204" pitchFamily="34" charset="0"/>
-                <a:buChar char="•"/>
-              </a:pPr>
-              <a:r>
-                <a:rPr lang="en-US" sz="1050" dirty="0" err="1">
-                  <a:solidFill>
-                    <a:schemeClr val="tx1"/>
-                  </a:solidFill>
-                </a:rPr>
-                <a:t>safety_score</a:t>
-              </a:r>
-              <a:endParaRPr lang="en-US" sz="1050" dirty="0">
-                <a:solidFill>
-                  <a:schemeClr val="tx1"/>
-                </a:solidFill>
-              </a:endParaRPr>
-            </a:p>
-            <a:p>
-              <a:pPr marL="285750" indent="-285750">
-                <a:buFont typeface="Arial" panose="020B0604020202020204" pitchFamily="34" charset="0"/>
-                <a:buChar char="•"/>
-              </a:pPr>
-              <a:r>
-                <a:rPr lang="en-US" sz="1050" dirty="0" err="1">
-                  <a:solidFill>
-                    <a:schemeClr val="tx1"/>
-                  </a:solidFill>
-                </a:rPr>
-                <a:t>readmission_score</a:t>
-              </a:r>
-              <a:endParaRPr lang="en-US" sz="1050" dirty="0">
-                <a:solidFill>
-                  <a:schemeClr val="tx1"/>
-                </a:solidFill>
-              </a:endParaRPr>
-            </a:p>
-            <a:p>
-              <a:pPr marL="285750" indent="-285750">
-                <a:buFont typeface="Arial" panose="020B0604020202020204" pitchFamily="34" charset="0"/>
-                <a:buChar char="•"/>
-              </a:pPr>
-              <a:r>
-                <a:rPr lang="en-US" sz="1050" dirty="0" err="1">
-                  <a:solidFill>
-                    <a:schemeClr val="tx1"/>
-                  </a:solidFill>
-                </a:rPr>
-                <a:t>patient_experience_score</a:t>
-              </a:r>
-              <a:endParaRPr lang="en-US" sz="1050" dirty="0">
-                <a:solidFill>
-                  <a:schemeClr val="tx1"/>
-                </a:solidFill>
-              </a:endParaRPr>
-            </a:p>
-            <a:p>
-              <a:pPr marL="285750" indent="-285750">
-                <a:buFont typeface="Arial" panose="020B0604020202020204" pitchFamily="34" charset="0"/>
-                <a:buChar char="•"/>
-              </a:pPr>
-              <a:r>
-                <a:rPr lang="en-US" sz="1050" dirty="0" err="1">
-                  <a:solidFill>
-                    <a:schemeClr val="tx1"/>
-                  </a:solidFill>
-                </a:rPr>
-                <a:t>effectiveness_score</a:t>
-              </a:r>
-              <a:endParaRPr lang="en-US" sz="1050" dirty="0">
-                <a:solidFill>
-                  <a:schemeClr val="tx1"/>
-                </a:solidFill>
-              </a:endParaRPr>
-            </a:p>
-            <a:p>
-              <a:pPr marL="285750" indent="-285750">
-                <a:buFont typeface="Arial" panose="020B0604020202020204" pitchFamily="34" charset="0"/>
-                <a:buChar char="•"/>
-              </a:pPr>
-              <a:r>
-                <a:rPr lang="en-US" sz="1050" dirty="0" err="1">
-                  <a:solidFill>
-                    <a:schemeClr val="tx1"/>
-                  </a:solidFill>
-                </a:rPr>
-                <a:t>timeliness_score</a:t>
-              </a:r>
-              <a:endParaRPr lang="en-US" sz="1050" dirty="0">
-                <a:solidFill>
-                  <a:schemeClr val="tx1"/>
-                </a:solidFill>
-              </a:endParaRPr>
-            </a:p>
-            <a:p>
-              <a:pPr marL="285750" indent="-285750">
-                <a:buFont typeface="Arial" panose="020B0604020202020204" pitchFamily="34" charset="0"/>
-                <a:buChar char="•"/>
-              </a:pPr>
-              <a:r>
-                <a:rPr lang="en-US" sz="1050" dirty="0" err="1">
-                  <a:solidFill>
-                    <a:schemeClr val="tx1"/>
-                  </a:solidFill>
-                </a:rPr>
-                <a:t>efficiency_score</a:t>
+                <a:t>total_score</a:t>
               </a:r>
               <a:endParaRPr lang="en-US" sz="1050" dirty="0">
                 <a:solidFill>
@@ -6453,7 +6339,7 @@
               <a:pPr algn="ctr"/>
               <a:r>
                 <a:rPr lang="en-US" sz="1050" dirty="0" err="1"/>
-                <a:t>hospital_baseline</a:t>
+                <a:t>top_hospitals</a:t>
               </a:r>
               <a:endParaRPr lang="en-US" sz="1050" dirty="0"/>
             </a:p>
@@ -6468,7 +6354,7 @@
         </p:nvGrpSpPr>
         <p:grpSpPr>
           <a:xfrm>
-            <a:off x="4015503" y="1539061"/>
+            <a:off x="4549184" y="1604836"/>
             <a:ext cx="1868062" cy="1613949"/>
             <a:chOff x="4091708" y="1958109"/>
             <a:chExt cx="2105892" cy="1850301"/>
@@ -6710,7 +6596,7 @@
         </p:nvGrpSpPr>
         <p:grpSpPr>
           <a:xfrm>
-            <a:off x="7257464" y="2859901"/>
+            <a:off x="7409863" y="2943029"/>
             <a:ext cx="3622971" cy="1952244"/>
             <a:chOff x="4091708" y="1958109"/>
             <a:chExt cx="2105892" cy="2238137"/>
@@ -6977,6 +6863,875 @@
                 <a:t>hospital_comparison</a:t>
               </a:r>
               <a:endParaRPr lang="en-US" sz="1050" dirty="0"/>
+            </a:p>
+          </p:txBody>
+        </p:sp>
+      </p:grpSp>
+      <p:grpSp>
+        <p:nvGrpSpPr>
+          <p:cNvPr id="11" name="Group 10"/>
+          <p:cNvGrpSpPr/>
+          <p:nvPr/>
+        </p:nvGrpSpPr>
+        <p:grpSpPr>
+          <a:xfrm>
+            <a:off x="7409863" y="635018"/>
+            <a:ext cx="2246752" cy="1804281"/>
+            <a:chOff x="4091708" y="1958109"/>
+            <a:chExt cx="2105892" cy="2068507"/>
+          </a:xfrm>
+        </p:grpSpPr>
+        <p:sp>
+          <p:nvSpPr>
+            <p:cNvPr id="12" name="Rectangle 11"/>
+            <p:cNvSpPr/>
+            <p:nvPr/>
+          </p:nvSpPr>
+          <p:spPr>
+            <a:xfrm>
+              <a:off x="4091710" y="2346036"/>
+              <a:ext cx="2105890" cy="1680580"/>
+            </a:xfrm>
+            <a:prstGeom prst="rect">
+              <a:avLst/>
+            </a:prstGeom>
+            <a:solidFill>
+              <a:schemeClr val="bg1"/>
+            </a:solidFill>
+            <a:ln>
+              <a:solidFill>
+                <a:schemeClr val="tx1"/>
+              </a:solidFill>
+            </a:ln>
+          </p:spPr>
+          <p:style>
+            <a:lnRef idx="2">
+              <a:schemeClr val="accent1">
+                <a:shade val="50000"/>
+              </a:schemeClr>
+            </a:lnRef>
+            <a:fillRef idx="1">
+              <a:schemeClr val="accent1"/>
+            </a:fillRef>
+            <a:effectRef idx="0">
+              <a:schemeClr val="accent1"/>
+            </a:effectRef>
+            <a:fontRef idx="minor">
+              <a:schemeClr val="lt1"/>
+            </a:fontRef>
+          </p:style>
+          <p:txBody>
+            <a:bodyPr rtlCol="0" anchor="t"/>
+            <a:lstStyle/>
+            <a:p>
+              <a:pPr marL="285750" indent="-285750">
+                <a:buFont typeface="Arial" panose="020B0604020202020204" pitchFamily="34" charset="0"/>
+                <a:buChar char="•"/>
+              </a:pPr>
+              <a:r>
+                <a:rPr lang="en-US" sz="1050" dirty="0" err="1">
+                  <a:solidFill>
+                    <a:schemeClr val="tx1"/>
+                  </a:solidFill>
+                </a:rPr>
+                <a:t>provider_id</a:t>
+              </a:r>
+              <a:endParaRPr lang="en-US" sz="1050" dirty="0">
+                <a:solidFill>
+                  <a:schemeClr val="tx1"/>
+                </a:solidFill>
+              </a:endParaRPr>
+            </a:p>
+            <a:p>
+              <a:pPr marL="285750" indent="-285750">
+                <a:buFont typeface="Arial" panose="020B0604020202020204" pitchFamily="34" charset="0"/>
+                <a:buChar char="•"/>
+              </a:pPr>
+              <a:r>
+                <a:rPr lang="en-US" sz="1050" dirty="0" err="1">
+                  <a:solidFill>
+                    <a:schemeClr val="tx1"/>
+                  </a:solidFill>
+                </a:rPr>
+                <a:t>mortality_score</a:t>
+              </a:r>
+              <a:endParaRPr lang="en-US" sz="1050" dirty="0">
+                <a:solidFill>
+                  <a:schemeClr val="tx1"/>
+                </a:solidFill>
+              </a:endParaRPr>
+            </a:p>
+            <a:p>
+              <a:pPr marL="285750" indent="-285750">
+                <a:buFont typeface="Arial" panose="020B0604020202020204" pitchFamily="34" charset="0"/>
+                <a:buChar char="•"/>
+              </a:pPr>
+              <a:r>
+                <a:rPr lang="en-US" sz="1050" dirty="0" err="1">
+                  <a:solidFill>
+                    <a:schemeClr val="tx1"/>
+                  </a:solidFill>
+                </a:rPr>
+                <a:t>safety_score</a:t>
+              </a:r>
+              <a:endParaRPr lang="en-US" sz="1050" dirty="0">
+                <a:solidFill>
+                  <a:schemeClr val="tx1"/>
+                </a:solidFill>
+              </a:endParaRPr>
+            </a:p>
+            <a:p>
+              <a:pPr marL="285750" indent="-285750">
+                <a:buFont typeface="Arial" panose="020B0604020202020204" pitchFamily="34" charset="0"/>
+                <a:buChar char="•"/>
+              </a:pPr>
+              <a:r>
+                <a:rPr lang="en-US" sz="1050" dirty="0" err="1">
+                  <a:solidFill>
+                    <a:schemeClr val="tx1"/>
+                  </a:solidFill>
+                </a:rPr>
+                <a:t>readmission_score</a:t>
+              </a:r>
+              <a:endParaRPr lang="en-US" sz="1050" dirty="0">
+                <a:solidFill>
+                  <a:schemeClr val="tx1"/>
+                </a:solidFill>
+              </a:endParaRPr>
+            </a:p>
+            <a:p>
+              <a:pPr marL="285750" indent="-285750">
+                <a:buFont typeface="Arial" panose="020B0604020202020204" pitchFamily="34" charset="0"/>
+                <a:buChar char="•"/>
+              </a:pPr>
+              <a:r>
+                <a:rPr lang="en-US" sz="1050" dirty="0" err="1">
+                  <a:solidFill>
+                    <a:schemeClr val="tx1"/>
+                  </a:solidFill>
+                </a:rPr>
+                <a:t>patient_experience_score</a:t>
+              </a:r>
+              <a:endParaRPr lang="en-US" sz="1050" dirty="0">
+                <a:solidFill>
+                  <a:schemeClr val="tx1"/>
+                </a:solidFill>
+              </a:endParaRPr>
+            </a:p>
+            <a:p>
+              <a:pPr marL="285750" indent="-285750">
+                <a:buFont typeface="Arial" panose="020B0604020202020204" pitchFamily="34" charset="0"/>
+                <a:buChar char="•"/>
+              </a:pPr>
+              <a:r>
+                <a:rPr lang="en-US" sz="1050" dirty="0" err="1">
+                  <a:solidFill>
+                    <a:schemeClr val="tx1"/>
+                  </a:solidFill>
+                </a:rPr>
+                <a:t>effectiveness_score</a:t>
+              </a:r>
+              <a:endParaRPr lang="en-US" sz="1050" dirty="0">
+                <a:solidFill>
+                  <a:schemeClr val="tx1"/>
+                </a:solidFill>
+              </a:endParaRPr>
+            </a:p>
+            <a:p>
+              <a:pPr marL="285750" indent="-285750">
+                <a:buFont typeface="Arial" panose="020B0604020202020204" pitchFamily="34" charset="0"/>
+                <a:buChar char="•"/>
+              </a:pPr>
+              <a:r>
+                <a:rPr lang="en-US" sz="1050" dirty="0" err="1">
+                  <a:solidFill>
+                    <a:schemeClr val="tx1"/>
+                  </a:solidFill>
+                </a:rPr>
+                <a:t>timeliness_score</a:t>
+              </a:r>
+              <a:endParaRPr lang="en-US" sz="1050" dirty="0">
+                <a:solidFill>
+                  <a:schemeClr val="tx1"/>
+                </a:solidFill>
+              </a:endParaRPr>
+            </a:p>
+            <a:p>
+              <a:pPr marL="285750" indent="-285750">
+                <a:buFont typeface="Arial" panose="020B0604020202020204" pitchFamily="34" charset="0"/>
+                <a:buChar char="•"/>
+              </a:pPr>
+              <a:r>
+                <a:rPr lang="en-US" sz="1050" dirty="0" err="1">
+                  <a:solidFill>
+                    <a:schemeClr val="tx1"/>
+                  </a:solidFill>
+                </a:rPr>
+                <a:t>efficiency_score</a:t>
+              </a:r>
+              <a:endParaRPr lang="en-US" sz="1050" dirty="0">
+                <a:solidFill>
+                  <a:schemeClr val="tx1"/>
+                </a:solidFill>
+              </a:endParaRPr>
+            </a:p>
+          </p:txBody>
+        </p:sp>
+        <p:sp>
+          <p:nvSpPr>
+            <p:cNvPr id="16" name="Rectangle 15"/>
+            <p:cNvSpPr/>
+            <p:nvPr/>
+          </p:nvSpPr>
+          <p:spPr>
+            <a:xfrm>
+              <a:off x="4091708" y="1958109"/>
+              <a:ext cx="2105891" cy="387927"/>
+            </a:xfrm>
+            <a:prstGeom prst="rect">
+              <a:avLst/>
+            </a:prstGeom>
+            <a:ln>
+              <a:solidFill>
+                <a:schemeClr val="tx1"/>
+              </a:solidFill>
+            </a:ln>
+          </p:spPr>
+          <p:style>
+            <a:lnRef idx="2">
+              <a:schemeClr val="accent1">
+                <a:shade val="50000"/>
+              </a:schemeClr>
+            </a:lnRef>
+            <a:fillRef idx="1">
+              <a:schemeClr val="accent1"/>
+            </a:fillRef>
+            <a:effectRef idx="0">
+              <a:schemeClr val="accent1"/>
+            </a:effectRef>
+            <a:fontRef idx="minor">
+              <a:schemeClr val="lt1"/>
+            </a:fontRef>
+          </p:style>
+          <p:txBody>
+            <a:bodyPr rtlCol="0" anchor="ctr"/>
+            <a:lstStyle/>
+            <a:p>
+              <a:pPr algn="ctr"/>
+              <a:r>
+                <a:rPr lang="en-US" sz="1050" dirty="0" err="1"/>
+                <a:t>hospital_baseline</a:t>
+              </a:r>
+              <a:endParaRPr lang="en-US" sz="1050" dirty="0"/>
+            </a:p>
+          </p:txBody>
+        </p:sp>
+      </p:grpSp>
+      <p:grpSp>
+        <p:nvGrpSpPr>
+          <p:cNvPr id="17" name="Group 16"/>
+          <p:cNvGrpSpPr/>
+          <p:nvPr/>
+        </p:nvGrpSpPr>
+        <p:grpSpPr>
+          <a:xfrm>
+            <a:off x="633257" y="1604836"/>
+            <a:ext cx="2246752" cy="755055"/>
+            <a:chOff x="4091708" y="1958109"/>
+            <a:chExt cx="2105892" cy="865628"/>
+          </a:xfrm>
+        </p:grpSpPr>
+        <p:sp>
+          <p:nvSpPr>
+            <p:cNvPr id="18" name="Rectangle 17"/>
+            <p:cNvSpPr/>
+            <p:nvPr/>
+          </p:nvSpPr>
+          <p:spPr>
+            <a:xfrm>
+              <a:off x="4091710" y="2346036"/>
+              <a:ext cx="2105890" cy="477701"/>
+            </a:xfrm>
+            <a:prstGeom prst="rect">
+              <a:avLst/>
+            </a:prstGeom>
+            <a:solidFill>
+              <a:schemeClr val="bg1"/>
+            </a:solidFill>
+            <a:ln>
+              <a:solidFill>
+                <a:schemeClr val="tx1"/>
+              </a:solidFill>
+            </a:ln>
+          </p:spPr>
+          <p:style>
+            <a:lnRef idx="2">
+              <a:schemeClr val="accent1">
+                <a:shade val="50000"/>
+              </a:schemeClr>
+            </a:lnRef>
+            <a:fillRef idx="1">
+              <a:schemeClr val="accent1"/>
+            </a:fillRef>
+            <a:effectRef idx="0">
+              <a:schemeClr val="accent1"/>
+            </a:effectRef>
+            <a:fontRef idx="minor">
+              <a:schemeClr val="lt1"/>
+            </a:fontRef>
+          </p:style>
+          <p:txBody>
+            <a:bodyPr rtlCol="0" anchor="t"/>
+            <a:lstStyle/>
+            <a:p>
+              <a:pPr marL="285750" indent="-285750">
+                <a:buFont typeface="Arial" panose="020B0604020202020204" pitchFamily="34" charset="0"/>
+                <a:buChar char="•"/>
+              </a:pPr>
+              <a:r>
+                <a:rPr lang="en-US" sz="1050" dirty="0">
+                  <a:solidFill>
+                    <a:schemeClr val="tx1"/>
+                  </a:solidFill>
+                </a:rPr>
+                <a:t>state</a:t>
+              </a:r>
+            </a:p>
+            <a:p>
+              <a:pPr marL="285750" indent="-285750">
+                <a:buFont typeface="Arial" panose="020B0604020202020204" pitchFamily="34" charset="0"/>
+                <a:buChar char="•"/>
+              </a:pPr>
+              <a:r>
+                <a:rPr lang="en-US" sz="1050" dirty="0" err="1">
+                  <a:solidFill>
+                    <a:schemeClr val="tx1"/>
+                  </a:solidFill>
+                </a:rPr>
+                <a:t>hospital_count</a:t>
+              </a:r>
+              <a:endParaRPr lang="en-US" sz="1050" dirty="0">
+                <a:solidFill>
+                  <a:schemeClr val="tx1"/>
+                </a:solidFill>
+              </a:endParaRPr>
+            </a:p>
+          </p:txBody>
+        </p:sp>
+        <p:sp>
+          <p:nvSpPr>
+            <p:cNvPr id="19" name="Rectangle 18"/>
+            <p:cNvSpPr/>
+            <p:nvPr/>
+          </p:nvSpPr>
+          <p:spPr>
+            <a:xfrm>
+              <a:off x="4091708" y="1958109"/>
+              <a:ext cx="2105891" cy="387927"/>
+            </a:xfrm>
+            <a:prstGeom prst="rect">
+              <a:avLst/>
+            </a:prstGeom>
+            <a:ln>
+              <a:solidFill>
+                <a:schemeClr val="tx1"/>
+              </a:solidFill>
+            </a:ln>
+          </p:spPr>
+          <p:style>
+            <a:lnRef idx="2">
+              <a:schemeClr val="accent1">
+                <a:shade val="50000"/>
+              </a:schemeClr>
+            </a:lnRef>
+            <a:fillRef idx="1">
+              <a:schemeClr val="accent1"/>
+            </a:fillRef>
+            <a:effectRef idx="0">
+              <a:schemeClr val="accent1"/>
+            </a:effectRef>
+            <a:fontRef idx="minor">
+              <a:schemeClr val="lt1"/>
+            </a:fontRef>
+          </p:style>
+          <p:txBody>
+            <a:bodyPr rtlCol="0" anchor="ctr"/>
+            <a:lstStyle/>
+            <a:p>
+              <a:pPr algn="ctr"/>
+              <a:r>
+                <a:rPr lang="en-US" sz="1050" dirty="0" err="1"/>
+                <a:t>states_hospital_count</a:t>
+              </a:r>
+              <a:endParaRPr lang="en-US" sz="1050" dirty="0"/>
+            </a:p>
+          </p:txBody>
+        </p:sp>
+      </p:grpSp>
+      <p:grpSp>
+        <p:nvGrpSpPr>
+          <p:cNvPr id="23" name="Group 22"/>
+          <p:cNvGrpSpPr/>
+          <p:nvPr/>
+        </p:nvGrpSpPr>
+        <p:grpSpPr>
+          <a:xfrm>
+            <a:off x="633257" y="2800945"/>
+            <a:ext cx="2923311" cy="3535295"/>
+            <a:chOff x="4091708" y="1958109"/>
+            <a:chExt cx="2105892" cy="4053015"/>
+          </a:xfrm>
+        </p:grpSpPr>
+        <p:sp>
+          <p:nvSpPr>
+            <p:cNvPr id="24" name="Rectangle 23"/>
+            <p:cNvSpPr/>
+            <p:nvPr/>
+          </p:nvSpPr>
+          <p:spPr>
+            <a:xfrm>
+              <a:off x="4091710" y="2346037"/>
+              <a:ext cx="2105890" cy="3665087"/>
+            </a:xfrm>
+            <a:prstGeom prst="rect">
+              <a:avLst/>
+            </a:prstGeom>
+            <a:solidFill>
+              <a:schemeClr val="bg1"/>
+            </a:solidFill>
+            <a:ln>
+              <a:solidFill>
+                <a:schemeClr val="tx1"/>
+              </a:solidFill>
+            </a:ln>
+          </p:spPr>
+          <p:style>
+            <a:lnRef idx="2">
+              <a:schemeClr val="accent1">
+                <a:shade val="50000"/>
+              </a:schemeClr>
+            </a:lnRef>
+            <a:fillRef idx="1">
+              <a:schemeClr val="accent1"/>
+            </a:fillRef>
+            <a:effectRef idx="0">
+              <a:schemeClr val="accent1"/>
+            </a:effectRef>
+            <a:fontRef idx="minor">
+              <a:schemeClr val="lt1"/>
+            </a:fontRef>
+          </p:style>
+          <p:txBody>
+            <a:bodyPr rtlCol="0" anchor="t"/>
+            <a:lstStyle/>
+            <a:p>
+              <a:pPr marL="285750" indent="-285750">
+                <a:buFont typeface="Arial" panose="020B0604020202020204" pitchFamily="34" charset="0"/>
+                <a:buChar char="•"/>
+              </a:pPr>
+              <a:r>
+                <a:rPr lang="en-US" sz="1050">
+                  <a:solidFill>
+                    <a:schemeClr val="tx1"/>
+                  </a:solidFill>
+                </a:rPr>
+                <a:t>provider_id</a:t>
+              </a:r>
+              <a:endParaRPr lang="en-US" sz="1050" dirty="0">
+                <a:solidFill>
+                  <a:schemeClr val="tx1"/>
+                </a:solidFill>
+              </a:endParaRPr>
+            </a:p>
+            <a:p>
+              <a:pPr marL="285750" indent="-285750">
+                <a:buFont typeface="Arial" panose="020B0604020202020204" pitchFamily="34" charset="0"/>
+                <a:buChar char="•"/>
+              </a:pPr>
+              <a:r>
+                <a:rPr lang="en-US" sz="1050" dirty="0" err="1">
+                  <a:solidFill>
+                    <a:schemeClr val="tx1"/>
+                  </a:solidFill>
+                </a:rPr>
+                <a:t>comm_nurses_baseline</a:t>
+              </a:r>
+              <a:endParaRPr lang="en-US" sz="1050" dirty="0">
+                <a:solidFill>
+                  <a:schemeClr val="tx1"/>
+                </a:solidFill>
+              </a:endParaRPr>
+            </a:p>
+            <a:p>
+              <a:pPr marL="285750" indent="-285750">
+                <a:buFont typeface="Arial" panose="020B0604020202020204" pitchFamily="34" charset="0"/>
+                <a:buChar char="•"/>
+              </a:pPr>
+              <a:r>
+                <a:rPr lang="en-US" sz="1050" dirty="0" err="1">
+                  <a:solidFill>
+                    <a:schemeClr val="tx1"/>
+                  </a:solidFill>
+                </a:rPr>
+                <a:t>comm_nurses_performance</a:t>
+              </a:r>
+              <a:endParaRPr lang="en-US" sz="1050" dirty="0">
+                <a:solidFill>
+                  <a:schemeClr val="tx1"/>
+                </a:solidFill>
+              </a:endParaRPr>
+            </a:p>
+            <a:p>
+              <a:pPr marL="285750" indent="-285750">
+                <a:buFont typeface="Arial" panose="020B0604020202020204" pitchFamily="34" charset="0"/>
+                <a:buChar char="•"/>
+              </a:pPr>
+              <a:r>
+                <a:rPr lang="en-US" sz="1050" dirty="0" err="1">
+                  <a:solidFill>
+                    <a:schemeClr val="tx1"/>
+                  </a:solidFill>
+                </a:rPr>
+                <a:t>comm_doctors_baseline</a:t>
+              </a:r>
+              <a:endParaRPr lang="en-US" sz="1050" dirty="0">
+                <a:solidFill>
+                  <a:schemeClr val="tx1"/>
+                </a:solidFill>
+              </a:endParaRPr>
+            </a:p>
+            <a:p>
+              <a:pPr marL="285750" indent="-285750">
+                <a:buFont typeface="Arial" panose="020B0604020202020204" pitchFamily="34" charset="0"/>
+                <a:buChar char="•"/>
+              </a:pPr>
+              <a:r>
+                <a:rPr lang="en-US" sz="1050" dirty="0" err="1">
+                  <a:solidFill>
+                    <a:schemeClr val="tx1"/>
+                  </a:solidFill>
+                </a:rPr>
+                <a:t>comm_doctors_performance</a:t>
+              </a:r>
+              <a:endParaRPr lang="en-US" sz="1050" dirty="0">
+                <a:solidFill>
+                  <a:schemeClr val="tx1"/>
+                </a:solidFill>
+              </a:endParaRPr>
+            </a:p>
+            <a:p>
+              <a:pPr marL="285750" indent="-285750">
+                <a:buFont typeface="Arial" panose="020B0604020202020204" pitchFamily="34" charset="0"/>
+                <a:buChar char="•"/>
+              </a:pPr>
+              <a:r>
+                <a:rPr lang="en-US" sz="1050" dirty="0" err="1">
+                  <a:solidFill>
+                    <a:schemeClr val="tx1"/>
+                  </a:solidFill>
+                </a:rPr>
+                <a:t>comm_medicines_baseline</a:t>
+              </a:r>
+              <a:endParaRPr lang="en-US" sz="1050" dirty="0">
+                <a:solidFill>
+                  <a:schemeClr val="tx1"/>
+                </a:solidFill>
+              </a:endParaRPr>
+            </a:p>
+            <a:p>
+              <a:pPr marL="285750" indent="-285750">
+                <a:buFont typeface="Arial" panose="020B0604020202020204" pitchFamily="34" charset="0"/>
+                <a:buChar char="•"/>
+              </a:pPr>
+              <a:r>
+                <a:rPr lang="en-US" sz="1050" dirty="0" err="1">
+                  <a:solidFill>
+                    <a:schemeClr val="tx1"/>
+                  </a:solidFill>
+                </a:rPr>
+                <a:t>comm_medicines_performnaces</a:t>
+              </a:r>
+              <a:endParaRPr lang="en-US" sz="1050" dirty="0">
+                <a:solidFill>
+                  <a:schemeClr val="tx1"/>
+                </a:solidFill>
+              </a:endParaRPr>
+            </a:p>
+            <a:p>
+              <a:pPr marL="285750" indent="-285750">
+                <a:buFont typeface="Arial" panose="020B0604020202020204" pitchFamily="34" charset="0"/>
+                <a:buChar char="•"/>
+              </a:pPr>
+              <a:r>
+                <a:rPr lang="en-US" sz="1050" dirty="0" err="1">
+                  <a:solidFill>
+                    <a:schemeClr val="tx1"/>
+                  </a:solidFill>
+                </a:rPr>
+                <a:t>responsiveness_staff_baseline</a:t>
+              </a:r>
+              <a:endParaRPr lang="en-US" sz="1050" dirty="0">
+                <a:solidFill>
+                  <a:schemeClr val="tx1"/>
+                </a:solidFill>
+              </a:endParaRPr>
+            </a:p>
+            <a:p>
+              <a:pPr marL="285750" indent="-285750">
+                <a:buFont typeface="Arial" panose="020B0604020202020204" pitchFamily="34" charset="0"/>
+                <a:buChar char="•"/>
+              </a:pPr>
+              <a:r>
+                <a:rPr lang="en-US" sz="1050" dirty="0" err="1">
+                  <a:solidFill>
+                    <a:schemeClr val="tx1"/>
+                  </a:solidFill>
+                </a:rPr>
+                <a:t>responsiveness_staff_performance</a:t>
+              </a:r>
+              <a:endParaRPr lang="en-US" sz="1050" dirty="0">
+                <a:solidFill>
+                  <a:schemeClr val="tx1"/>
+                </a:solidFill>
+              </a:endParaRPr>
+            </a:p>
+            <a:p>
+              <a:pPr marL="285750" indent="-285750">
+                <a:buFont typeface="Arial" panose="020B0604020202020204" pitchFamily="34" charset="0"/>
+                <a:buChar char="•"/>
+              </a:pPr>
+              <a:r>
+                <a:rPr lang="en-US" sz="1050" dirty="0" err="1">
+                  <a:solidFill>
+                    <a:schemeClr val="tx1"/>
+                  </a:solidFill>
+                </a:rPr>
+                <a:t>pain_management_baseline</a:t>
+              </a:r>
+              <a:endParaRPr lang="en-US" sz="1050" dirty="0">
+                <a:solidFill>
+                  <a:schemeClr val="tx1"/>
+                </a:solidFill>
+              </a:endParaRPr>
+            </a:p>
+            <a:p>
+              <a:pPr marL="285750" indent="-285750">
+                <a:buFont typeface="Arial" panose="020B0604020202020204" pitchFamily="34" charset="0"/>
+                <a:buChar char="•"/>
+              </a:pPr>
+              <a:r>
+                <a:rPr lang="en-US" sz="1050" dirty="0" err="1">
+                  <a:solidFill>
+                    <a:schemeClr val="tx1"/>
+                  </a:solidFill>
+                </a:rPr>
+                <a:t>pain_management_performance</a:t>
+              </a:r>
+              <a:endParaRPr lang="en-US" sz="1050" dirty="0">
+                <a:solidFill>
+                  <a:schemeClr val="tx1"/>
+                </a:solidFill>
+              </a:endParaRPr>
+            </a:p>
+            <a:p>
+              <a:pPr marL="285750" indent="-285750">
+                <a:buFont typeface="Arial" panose="020B0604020202020204" pitchFamily="34" charset="0"/>
+                <a:buChar char="•"/>
+              </a:pPr>
+              <a:r>
+                <a:rPr lang="en-US" sz="1050" dirty="0" err="1">
+                  <a:solidFill>
+                    <a:schemeClr val="tx1"/>
+                  </a:solidFill>
+                </a:rPr>
+                <a:t>clean_quiet_performance</a:t>
+              </a:r>
+              <a:endParaRPr lang="en-US" sz="1050" dirty="0">
+                <a:solidFill>
+                  <a:schemeClr val="tx1"/>
+                </a:solidFill>
+              </a:endParaRPr>
+            </a:p>
+            <a:p>
+              <a:pPr marL="285750" indent="-285750">
+                <a:buFont typeface="Arial" panose="020B0604020202020204" pitchFamily="34" charset="0"/>
+                <a:buChar char="•"/>
+              </a:pPr>
+              <a:r>
+                <a:rPr lang="en-US" sz="1050" dirty="0" err="1">
+                  <a:solidFill>
+                    <a:schemeClr val="tx1"/>
+                  </a:solidFill>
+                </a:rPr>
+                <a:t>clean_quiet_achievement</a:t>
+              </a:r>
+              <a:endParaRPr lang="en-US" sz="1050" dirty="0">
+                <a:solidFill>
+                  <a:schemeClr val="tx1"/>
+                </a:solidFill>
+              </a:endParaRPr>
+            </a:p>
+            <a:p>
+              <a:pPr marL="285750" indent="-285750">
+                <a:buFont typeface="Arial" panose="020B0604020202020204" pitchFamily="34" charset="0"/>
+                <a:buChar char="•"/>
+              </a:pPr>
+              <a:r>
+                <a:rPr lang="en-US" sz="1050" dirty="0" err="1">
+                  <a:solidFill>
+                    <a:schemeClr val="tx1"/>
+                  </a:solidFill>
+                </a:rPr>
+                <a:t>discharge_baseline</a:t>
+              </a:r>
+              <a:endParaRPr lang="en-US" sz="1050" dirty="0">
+                <a:solidFill>
+                  <a:schemeClr val="tx1"/>
+                </a:solidFill>
+              </a:endParaRPr>
+            </a:p>
+            <a:p>
+              <a:pPr marL="285750" indent="-285750">
+                <a:buFont typeface="Arial" panose="020B0604020202020204" pitchFamily="34" charset="0"/>
+                <a:buChar char="•"/>
+              </a:pPr>
+              <a:r>
+                <a:rPr lang="en-US" sz="1050" dirty="0" err="1">
+                  <a:solidFill>
+                    <a:schemeClr val="tx1"/>
+                  </a:solidFill>
+                </a:rPr>
+                <a:t>discharge_performance</a:t>
+              </a:r>
+              <a:endParaRPr lang="en-US" sz="1050" dirty="0">
+                <a:solidFill>
+                  <a:schemeClr val="tx1"/>
+                </a:solidFill>
+              </a:endParaRPr>
+            </a:p>
+            <a:p>
+              <a:pPr marL="285750" indent="-285750">
+                <a:buFont typeface="Arial" panose="020B0604020202020204" pitchFamily="34" charset="0"/>
+                <a:buChar char="•"/>
+              </a:pPr>
+              <a:r>
+                <a:rPr lang="en-US" sz="1050" dirty="0" err="1">
+                  <a:solidFill>
+                    <a:schemeClr val="tx1"/>
+                  </a:solidFill>
+                </a:rPr>
+                <a:t>overall_rating_baseline</a:t>
+              </a:r>
+              <a:endParaRPr lang="en-US" sz="1050" dirty="0">
+                <a:solidFill>
+                  <a:schemeClr val="tx1"/>
+                </a:solidFill>
+              </a:endParaRPr>
+            </a:p>
+            <a:p>
+              <a:pPr marL="285750" indent="-285750">
+                <a:buFont typeface="Arial" panose="020B0604020202020204" pitchFamily="34" charset="0"/>
+                <a:buChar char="•"/>
+              </a:pPr>
+              <a:r>
+                <a:rPr lang="en-US" sz="1050" dirty="0" err="1">
+                  <a:solidFill>
+                    <a:schemeClr val="tx1"/>
+                  </a:solidFill>
+                </a:rPr>
+                <a:t>overall_rating_performance</a:t>
+              </a:r>
+              <a:endParaRPr lang="en-US" sz="1050" dirty="0">
+                <a:solidFill>
+                  <a:schemeClr val="tx1"/>
+                </a:solidFill>
+              </a:endParaRPr>
+            </a:p>
+            <a:p>
+              <a:pPr marL="285750" indent="-285750">
+                <a:buFont typeface="Arial" panose="020B0604020202020204" pitchFamily="34" charset="0"/>
+                <a:buChar char="•"/>
+              </a:pPr>
+              <a:r>
+                <a:rPr lang="en-US" sz="1050" dirty="0" err="1">
+                  <a:solidFill>
+                    <a:schemeClr val="tx1"/>
+                  </a:solidFill>
+                </a:rPr>
+                <a:t>hcahps_base_score</a:t>
+              </a:r>
+              <a:endParaRPr lang="en-US" sz="1050" dirty="0">
+                <a:solidFill>
+                  <a:schemeClr val="tx1"/>
+                </a:solidFill>
+              </a:endParaRPr>
+            </a:p>
+            <a:p>
+              <a:pPr marL="285750" indent="-285750">
+                <a:buFont typeface="Arial" panose="020B0604020202020204" pitchFamily="34" charset="0"/>
+                <a:buChar char="•"/>
+              </a:pPr>
+              <a:r>
+                <a:rPr lang="en-US" sz="1050" dirty="0" err="1">
+                  <a:solidFill>
+                    <a:schemeClr val="tx1"/>
+                  </a:solidFill>
+                </a:rPr>
+                <a:t>hcahps_consistency_score</a:t>
+              </a:r>
+              <a:endParaRPr lang="en-US" sz="1050" dirty="0">
+                <a:solidFill>
+                  <a:schemeClr val="tx1"/>
+                </a:solidFill>
+              </a:endParaRPr>
+            </a:p>
+          </p:txBody>
+        </p:sp>
+        <p:sp>
+          <p:nvSpPr>
+            <p:cNvPr id="25" name="Rectangle 24"/>
+            <p:cNvSpPr/>
+            <p:nvPr/>
+          </p:nvSpPr>
+          <p:spPr>
+            <a:xfrm>
+              <a:off x="4091708" y="1958109"/>
+              <a:ext cx="2105891" cy="387927"/>
+            </a:xfrm>
+            <a:prstGeom prst="rect">
+              <a:avLst/>
+            </a:prstGeom>
+            <a:ln>
+              <a:solidFill>
+                <a:schemeClr val="tx1"/>
+              </a:solidFill>
+            </a:ln>
+          </p:spPr>
+          <p:style>
+            <a:lnRef idx="2">
+              <a:schemeClr val="accent1">
+                <a:shade val="50000"/>
+              </a:schemeClr>
+            </a:lnRef>
+            <a:fillRef idx="1">
+              <a:schemeClr val="accent1"/>
+            </a:fillRef>
+            <a:effectRef idx="0">
+              <a:schemeClr val="accent1"/>
+            </a:effectRef>
+            <a:fontRef idx="minor">
+              <a:schemeClr val="lt1"/>
+            </a:fontRef>
+          </p:style>
+          <p:txBody>
+            <a:bodyPr rtlCol="0" anchor="ctr"/>
+            <a:lstStyle/>
+            <a:p>
+              <a:pPr algn="ctr"/>
+              <a:r>
+                <a:rPr lang="en-US" sz="1050" dirty="0"/>
+                <a:t>surveys</a:t>
+              </a:r>
             </a:p>
           </p:txBody>
         </p:sp>

</xml_diff>